<commit_message>
last update of slides
</commit_message>
<xml_diff>
--- a/Slides/OF_200218_GREEKC.pptx
+++ b/Slides/OF_200218_GREEKC.pptx
@@ -19,6 +19,7 @@
     <p:sldId id="264" r:id="rId13"/>
     <p:sldId id="265" r:id="rId14"/>
     <p:sldId id="266" r:id="rId15"/>
+    <p:sldId id="267" r:id="rId16"/>
   </p:sldIdLst>
   <p:sldSz cy="6858000" cx="9144000"/>
   <p:notesSz cx="6858000" cy="9144000"/>
@@ -253,7 +254,7 @@
   </p:defaultTextStyle>
   <p:extLst>
     <p:ext uri="http://customooxmlschemas.google.com/">
-      <go:slidesCustomData xmlns:go="http://customooxmlschemas.google.com/" r:id="rId16" roundtripDataSignature="AMtx7mgmWBcUBaPQGnEu093gX/yaE73lIA=="/>
+      <go:slidesCustomData xmlns:go="http://customooxmlschemas.google.com/" r:id="rId17" roundtripDataSignature="AMtx7miH3FGHtsa2LhIZCgXZTc3PwQb2cw=="/>
     </p:ext>
   </p:extLst>
 </p:presentation>
@@ -1873,6 +1874,171 @@
       <p:sp>
         <p:nvSpPr>
           <p:cNvPr id="205" name="Google Shape;205;g7e530ecb0e_2_90:notes"/>
+          <p:cNvSpPr txBox="1"/>
+          <p:nvPr>
+            <p:ph idx="12" type="sldNum"/>
+          </p:nvPr>
+        </p:nvSpPr>
+        <p:spPr>
+          <a:xfrm>
+            <a:off x="3884613" y="8685213"/>
+            <a:ext cx="2971800" cy="458700"/>
+          </a:xfrm>
+          <a:prstGeom prst="rect">
+            <a:avLst/>
+          </a:prstGeom>
+          <a:noFill/>
+          <a:ln>
+            <a:noFill/>
+          </a:ln>
+        </p:spPr>
+        <p:txBody>
+          <a:bodyPr anchorCtr="0" anchor="b" bIns="45700" lIns="91425" spcFirstLastPara="1" rIns="91425" wrap="square" tIns="45700">
+            <a:noAutofit/>
+          </a:bodyPr>
+          <a:lstStyle/>
+          <a:p>
+            <a:pPr indent="0" lvl="0" marL="0" rtl="0" algn="r">
+              <a:spcBef>
+                <a:spcPts val="0"/>
+              </a:spcBef>
+              <a:spcAft>
+                <a:spcPts val="0"/>
+              </a:spcAft>
+              <a:buNone/>
+            </a:pPr>
+            <a:fld id="{00000000-1234-1234-1234-123412341234}" type="slidenum">
+              <a:rPr lang="en-CA"/>
+              <a:t>‹#›</a:t>
+            </a:fld>
+            <a:endParaRPr/>
+          </a:p>
+        </p:txBody>
+      </p:sp>
+    </p:spTree>
+  </p:cSld>
+  <p:clrMapOvr>
+    <a:masterClrMapping/>
+  </p:clrMapOvr>
+</p:notes>
+</file>
+
+<file path=ppt/notesSlides/notesSlide12.xml><?xml version="1.0" encoding="utf-8"?>
+<p:notes xmlns:a="http://schemas.openxmlformats.org/drawingml/2006/main" xmlns:r="http://schemas.openxmlformats.org/officeDocument/2006/relationships" xmlns:mc="http://schemas.openxmlformats.org/markup-compatibility/2006" xmlns:mv="urn:schemas-microsoft-com:mac:vml" xmlns:p="http://schemas.openxmlformats.org/presentationml/2006/main" xmlns:c="http://schemas.openxmlformats.org/drawingml/2006/chart" xmlns:dgm="http://schemas.openxmlformats.org/drawingml/2006/diagram" xmlns:o="urn:schemas-microsoft-com:office:office" xmlns:v="urn:schemas-microsoft-com:vml" xmlns:pvml="urn:schemas-microsoft-com:office:powerpoint" xmlns:com="http://schemas.openxmlformats.org/drawingml/2006/compatibility" xmlns:p14="http://schemas.microsoft.com/office/powerpoint/2010/main" xmlns:p15="http://schemas.microsoft.com/office/powerpoint/2012/main" showMasterPhAnim="0" showMasterSp="0">
+  <p:cSld>
+    <p:spTree>
+      <p:nvGrpSpPr>
+        <p:cNvPr id="211" name="Shape 211"/>
+        <p:cNvGrpSpPr/>
+        <p:nvPr/>
+      </p:nvGrpSpPr>
+      <p:grpSpPr>
+        <a:xfrm>
+          <a:off x="0" y="0"/>
+          <a:ext cx="0" cy="0"/>
+          <a:chOff x="0" y="0"/>
+          <a:chExt cx="0" cy="0"/>
+        </a:xfrm>
+      </p:grpSpPr>
+      <p:sp>
+        <p:nvSpPr>
+          <p:cNvPr id="212" name="Google Shape;212;g7e530ecb0e_4_27:notes"/>
+          <p:cNvSpPr/>
+          <p:nvPr>
+            <p:ph idx="2" type="sldImg"/>
+          </p:nvPr>
+        </p:nvSpPr>
+        <p:spPr>
+          <a:xfrm>
+            <a:off x="1371600" y="1143000"/>
+            <a:ext cx="4114800" cy="3086100"/>
+          </a:xfrm>
+          <a:custGeom>
+            <a:rect b="b" l="l" r="r" t="t"/>
+            <a:pathLst>
+              <a:path extrusionOk="0" h="120000" w="120000">
+                <a:moveTo>
+                  <a:pt x="0" y="0"/>
+                </a:moveTo>
+                <a:lnTo>
+                  <a:pt x="120000" y="0"/>
+                </a:lnTo>
+                <a:lnTo>
+                  <a:pt x="120000" y="120000"/>
+                </a:lnTo>
+                <a:lnTo>
+                  <a:pt x="0" y="120000"/>
+                </a:lnTo>
+                <a:close/>
+              </a:path>
+            </a:pathLst>
+          </a:custGeom>
+          <a:noFill/>
+          <a:ln cap="flat" cmpd="sng" w="12700">
+            <a:solidFill>
+              <a:srgbClr val="000000"/>
+            </a:solidFill>
+            <a:prstDash val="solid"/>
+            <a:round/>
+            <a:headEnd len="sm" w="sm" type="none"/>
+            <a:tailEnd len="sm" w="sm" type="none"/>
+          </a:ln>
+        </p:spPr>
+      </p:sp>
+      <p:sp>
+        <p:nvSpPr>
+          <p:cNvPr id="213" name="Google Shape;213;g7e530ecb0e_4_27:notes"/>
+          <p:cNvSpPr txBox="1"/>
+          <p:nvPr>
+            <p:ph idx="1" type="body"/>
+          </p:nvPr>
+        </p:nvSpPr>
+        <p:spPr>
+          <a:xfrm>
+            <a:off x="685800" y="4400550"/>
+            <a:ext cx="5486400" cy="3600600"/>
+          </a:xfrm>
+          <a:prstGeom prst="rect">
+            <a:avLst/>
+          </a:prstGeom>
+          <a:noFill/>
+          <a:ln>
+            <a:noFill/>
+          </a:ln>
+        </p:spPr>
+        <p:txBody>
+          <a:bodyPr anchorCtr="0" anchor="t" bIns="45700" lIns="91425" spcFirstLastPara="1" rIns="91425" wrap="square" tIns="45700">
+            <a:noAutofit/>
+          </a:bodyPr>
+          <a:lstStyle/>
+          <a:p>
+            <a:pPr indent="0" lvl="0" marL="0" marR="0" rtl="0" algn="l">
+              <a:lnSpc>
+                <a:spcPct val="100000"/>
+              </a:lnSpc>
+              <a:spcBef>
+                <a:spcPts val="0"/>
+              </a:spcBef>
+              <a:spcAft>
+                <a:spcPts val="0"/>
+              </a:spcAft>
+              <a:buClr>
+                <a:schemeClr val="dk1"/>
+              </a:buClr>
+              <a:buSzPts val="1200"/>
+              <a:buFont typeface="Calibri"/>
+              <a:buNone/>
+            </a:pPr>
+            <a:r>
+              <a:t/>
+            </a:r>
+            <a:endParaRPr/>
+          </a:p>
+        </p:txBody>
+      </p:sp>
+      <p:sp>
+        <p:nvSpPr>
+          <p:cNvPr id="214" name="Google Shape;214;g7e530ecb0e_4_27:notes"/>
           <p:cNvSpPr txBox="1"/>
           <p:nvPr>
             <p:ph idx="12" type="sldNum"/>
@@ -15355,6 +15521,415 @@
 </p:sld>
 </file>
 
+<file path=ppt/slides/slide12.xml><?xml version="1.0" encoding="utf-8"?>
+<p:sld xmlns:a="http://schemas.openxmlformats.org/drawingml/2006/main" xmlns:r="http://schemas.openxmlformats.org/officeDocument/2006/relationships" xmlns:mc="http://schemas.openxmlformats.org/markup-compatibility/2006" xmlns:mv="urn:schemas-microsoft-com:mac:vml" xmlns:p="http://schemas.openxmlformats.org/presentationml/2006/main" xmlns:c="http://schemas.openxmlformats.org/drawingml/2006/chart" xmlns:dgm="http://schemas.openxmlformats.org/drawingml/2006/diagram" xmlns:o="urn:schemas-microsoft-com:office:office" xmlns:v="urn:schemas-microsoft-com:vml" xmlns:pvml="urn:schemas-microsoft-com:office:powerpoint" xmlns:com="http://schemas.openxmlformats.org/drawingml/2006/compatibility" xmlns:p14="http://schemas.microsoft.com/office/powerpoint/2010/main" xmlns:p15="http://schemas.microsoft.com/office/powerpoint/2012/main">
+  <p:cSld>
+    <p:spTree>
+      <p:nvGrpSpPr>
+        <p:cNvPr id="215" name="Shape 215"/>
+        <p:cNvGrpSpPr/>
+        <p:nvPr/>
+      </p:nvGrpSpPr>
+      <p:grpSpPr>
+        <a:xfrm>
+          <a:off x="0" y="0"/>
+          <a:ext cx="0" cy="0"/>
+          <a:chOff x="0" y="0"/>
+          <a:chExt cx="0" cy="0"/>
+        </a:xfrm>
+      </p:grpSpPr>
+      <p:cxnSp>
+        <p:nvCxnSpPr>
+          <p:cNvPr id="216" name="Google Shape;216;g7e530ecb0e_4_27"/>
+          <p:cNvCxnSpPr/>
+          <p:nvPr/>
+        </p:nvCxnSpPr>
+        <p:spPr>
+          <a:xfrm>
+            <a:off x="535692" y="618184"/>
+            <a:ext cx="8072700" cy="0"/>
+          </a:xfrm>
+          <a:prstGeom prst="straightConnector1">
+            <a:avLst/>
+          </a:prstGeom>
+          <a:noFill/>
+          <a:ln cap="flat" cmpd="sng" w="57150">
+            <a:solidFill>
+              <a:srgbClr val="002060"/>
+            </a:solidFill>
+            <a:prstDash val="solid"/>
+            <a:miter lim="800000"/>
+            <a:headEnd len="sm" w="sm" type="none"/>
+            <a:tailEnd len="sm" w="sm" type="none"/>
+          </a:ln>
+        </p:spPr>
+      </p:cxnSp>
+      <p:sp>
+        <p:nvSpPr>
+          <p:cNvPr id="217" name="Google Shape;217;g7e530ecb0e_4_27"/>
+          <p:cNvSpPr txBox="1"/>
+          <p:nvPr/>
+        </p:nvSpPr>
+        <p:spPr>
+          <a:xfrm>
+            <a:off x="1570268" y="32093"/>
+            <a:ext cx="6003600" cy="554100"/>
+          </a:xfrm>
+          <a:prstGeom prst="rect">
+            <a:avLst/>
+          </a:prstGeom>
+          <a:noFill/>
+          <a:ln>
+            <a:noFill/>
+          </a:ln>
+        </p:spPr>
+        <p:txBody>
+          <a:bodyPr anchorCtr="0" anchor="t" bIns="45700" lIns="91425" spcFirstLastPara="1" rIns="91425" wrap="square" tIns="45700">
+            <a:noAutofit/>
+          </a:bodyPr>
+          <a:lstStyle/>
+          <a:p>
+            <a:pPr indent="0" lvl="0" marL="0" marR="0" rtl="0" algn="ctr">
+              <a:spcBef>
+                <a:spcPts val="0"/>
+              </a:spcBef>
+              <a:spcAft>
+                <a:spcPts val="0"/>
+              </a:spcAft>
+              <a:buNone/>
+            </a:pPr>
+            <a:r>
+              <a:rPr b="1" lang="en-CA" sz="3000">
+                <a:solidFill>
+                  <a:srgbClr val="002060"/>
+                </a:solidFill>
+              </a:rPr>
+              <a:t>Next steps</a:t>
+            </a:r>
+            <a:endParaRPr/>
+          </a:p>
+        </p:txBody>
+      </p:sp>
+      <p:sp>
+        <p:nvSpPr>
+          <p:cNvPr id="218" name="Google Shape;218;g7e530ecb0e_4_27"/>
+          <p:cNvSpPr txBox="1"/>
+          <p:nvPr>
+            <p:ph idx="12" type="sldNum"/>
+          </p:nvPr>
+        </p:nvSpPr>
+        <p:spPr>
+          <a:xfrm>
+            <a:off x="6457950" y="6356351"/>
+            <a:ext cx="2057400" cy="365100"/>
+          </a:xfrm>
+          <a:prstGeom prst="rect">
+            <a:avLst/>
+          </a:prstGeom>
+          <a:noFill/>
+          <a:ln>
+            <a:noFill/>
+          </a:ln>
+        </p:spPr>
+        <p:txBody>
+          <a:bodyPr anchorCtr="0" anchor="ctr" bIns="45700" lIns="91425" spcFirstLastPara="1" rIns="91425" wrap="square" tIns="45700">
+            <a:noAutofit/>
+          </a:bodyPr>
+          <a:lstStyle/>
+          <a:p>
+            <a:pPr indent="0" lvl="0" marL="0" rtl="0" algn="r">
+              <a:spcBef>
+                <a:spcPts val="0"/>
+              </a:spcBef>
+              <a:spcAft>
+                <a:spcPts val="0"/>
+              </a:spcAft>
+              <a:buNone/>
+            </a:pPr>
+            <a:fld id="{00000000-1234-1234-1234-123412341234}" type="slidenum">
+              <a:rPr lang="en-CA"/>
+              <a:t>‹#›</a:t>
+            </a:fld>
+            <a:endParaRPr/>
+          </a:p>
+        </p:txBody>
+      </p:sp>
+      <p:sp>
+        <p:nvSpPr>
+          <p:cNvPr id="219" name="Google Shape;219;g7e530ecb0e_4_27"/>
+          <p:cNvSpPr txBox="1"/>
+          <p:nvPr/>
+        </p:nvSpPr>
+        <p:spPr>
+          <a:xfrm>
+            <a:off x="576695" y="768100"/>
+            <a:ext cx="7990500" cy="3785700"/>
+          </a:xfrm>
+          <a:prstGeom prst="rect">
+            <a:avLst/>
+          </a:prstGeom>
+          <a:noFill/>
+          <a:ln>
+            <a:noFill/>
+          </a:ln>
+        </p:spPr>
+        <p:txBody>
+          <a:bodyPr anchorCtr="0" anchor="t" bIns="45700" lIns="91425" spcFirstLastPara="1" rIns="91425" wrap="square" tIns="45700">
+            <a:noAutofit/>
+          </a:bodyPr>
+          <a:lstStyle/>
+          <a:p>
+            <a:pPr indent="-342900" lvl="0" marL="342900" marR="0" rtl="0" algn="l">
+              <a:spcBef>
+                <a:spcPts val="0"/>
+              </a:spcBef>
+              <a:spcAft>
+                <a:spcPts val="0"/>
+              </a:spcAft>
+              <a:buClr>
+                <a:schemeClr val="dk1"/>
+              </a:buClr>
+              <a:buSzPts val="2000"/>
+              <a:buFont typeface="Arial"/>
+              <a:buChar char="•"/>
+            </a:pPr>
+            <a:r>
+              <a:rPr lang="en-CA" sz="2000">
+                <a:solidFill>
+                  <a:schemeClr val="dk1"/>
+                </a:solidFill>
+              </a:rPr>
+              <a:t>Ensure that the</a:t>
+            </a:r>
+            <a:r>
+              <a:rPr lang="en-CA" sz="2000">
+                <a:solidFill>
+                  <a:schemeClr val="dk1"/>
+                </a:solidFill>
+                <a:latin typeface="Arial"/>
+                <a:ea typeface="Arial"/>
+                <a:cs typeface="Arial"/>
+                <a:sym typeface="Arial"/>
+              </a:rPr>
+              <a:t> representative set of</a:t>
+            </a:r>
+            <a:r>
+              <a:rPr lang="en-CA" sz="2000">
+                <a:solidFill>
+                  <a:schemeClr val="dk1"/>
+                </a:solidFill>
+                <a:latin typeface="Arial"/>
+                <a:ea typeface="Arial"/>
+                <a:cs typeface="Arial"/>
+                <a:sym typeface="Arial"/>
+              </a:rPr>
+              <a:t> TFs</a:t>
+            </a:r>
+            <a:r>
+              <a:rPr lang="en-CA" sz="2000">
+                <a:solidFill>
+                  <a:schemeClr val="dk1"/>
+                </a:solidFill>
+              </a:rPr>
+              <a:t> contains only sequence-specific DNA-binding TFs</a:t>
+            </a:r>
+            <a:endParaRPr sz="2000">
+              <a:solidFill>
+                <a:schemeClr val="dk1"/>
+              </a:solidFill>
+            </a:endParaRPr>
+          </a:p>
+          <a:p>
+            <a:pPr indent="0" lvl="0" marL="0" marR="0" rtl="0" algn="l">
+              <a:spcBef>
+                <a:spcPts val="0"/>
+              </a:spcBef>
+              <a:spcAft>
+                <a:spcPts val="0"/>
+              </a:spcAft>
+              <a:buNone/>
+            </a:pPr>
+            <a:r>
+              <a:t/>
+            </a:r>
+            <a:endParaRPr sz="2000">
+              <a:solidFill>
+                <a:schemeClr val="dk1"/>
+              </a:solidFill>
+            </a:endParaRPr>
+          </a:p>
+          <a:p>
+            <a:pPr indent="0" lvl="0" marL="0" marR="0" rtl="0" algn="l">
+              <a:spcBef>
+                <a:spcPts val="0"/>
+              </a:spcBef>
+              <a:spcAft>
+                <a:spcPts val="0"/>
+              </a:spcAft>
+              <a:buNone/>
+            </a:pPr>
+            <a:r>
+              <a:t/>
+            </a:r>
+            <a:endParaRPr sz="2000">
+              <a:solidFill>
+                <a:schemeClr val="dk1"/>
+              </a:solidFill>
+            </a:endParaRPr>
+          </a:p>
+          <a:p>
+            <a:pPr indent="-342900" lvl="0" marL="342900" marR="0" rtl="0" algn="l">
+              <a:spcBef>
+                <a:spcPts val="0"/>
+              </a:spcBef>
+              <a:spcAft>
+                <a:spcPts val="0"/>
+              </a:spcAft>
+              <a:buClr>
+                <a:schemeClr val="dk1"/>
+              </a:buClr>
+              <a:buSzPts val="2000"/>
+              <a:buChar char="•"/>
+            </a:pPr>
+            <a:r>
+              <a:rPr lang="en-CA" sz="2000">
+                <a:solidFill>
+                  <a:schemeClr val="dk1"/>
+                </a:solidFill>
+              </a:rPr>
+              <a:t>For each representative TF, ensure that the mapped experimental data correspond to that TF</a:t>
+            </a:r>
+            <a:endParaRPr sz="2000">
+              <a:solidFill>
+                <a:schemeClr val="dk1"/>
+              </a:solidFill>
+            </a:endParaRPr>
+          </a:p>
+          <a:p>
+            <a:pPr indent="0" lvl="0" marL="0" marR="0" rtl="0" algn="l">
+              <a:spcBef>
+                <a:spcPts val="0"/>
+              </a:spcBef>
+              <a:spcAft>
+                <a:spcPts val="0"/>
+              </a:spcAft>
+              <a:buNone/>
+            </a:pPr>
+            <a:br>
+              <a:rPr b="0" i="0" lang="en-CA" sz="2000" u="none" cap="none" strike="noStrike">
+                <a:solidFill>
+                  <a:schemeClr val="dk1"/>
+                </a:solidFill>
+                <a:latin typeface="Calibri"/>
+                <a:ea typeface="Calibri"/>
+                <a:cs typeface="Calibri"/>
+                <a:sym typeface="Calibri"/>
+              </a:rPr>
+            </a:br>
+            <a:endParaRPr b="0" i="0" sz="2000" u="none" cap="none" strike="noStrike">
+              <a:solidFill>
+                <a:schemeClr val="dk1"/>
+              </a:solidFill>
+              <a:latin typeface="Arial"/>
+              <a:ea typeface="Arial"/>
+              <a:cs typeface="Arial"/>
+              <a:sym typeface="Arial"/>
+            </a:endParaRPr>
+          </a:p>
+          <a:p>
+            <a:pPr indent="-215900" lvl="0" marL="342900" marR="0" rtl="0" algn="l">
+              <a:spcBef>
+                <a:spcPts val="0"/>
+              </a:spcBef>
+              <a:spcAft>
+                <a:spcPts val="0"/>
+              </a:spcAft>
+              <a:buClr>
+                <a:schemeClr val="dk1"/>
+              </a:buClr>
+              <a:buSzPts val="2000"/>
+              <a:buFont typeface="Arial"/>
+              <a:buNone/>
+            </a:pPr>
+            <a:r>
+              <a:t/>
+            </a:r>
+            <a:endParaRPr sz="2000">
+              <a:solidFill>
+                <a:schemeClr val="dk1"/>
+              </a:solidFill>
+              <a:latin typeface="Arial"/>
+              <a:ea typeface="Arial"/>
+              <a:cs typeface="Arial"/>
+              <a:sym typeface="Arial"/>
+            </a:endParaRPr>
+          </a:p>
+          <a:p>
+            <a:pPr indent="-215900" lvl="0" marL="342900" marR="0" rtl="0" algn="l">
+              <a:spcBef>
+                <a:spcPts val="0"/>
+              </a:spcBef>
+              <a:spcAft>
+                <a:spcPts val="0"/>
+              </a:spcAft>
+              <a:buClr>
+                <a:schemeClr val="dk1"/>
+              </a:buClr>
+              <a:buSzPts val="2000"/>
+              <a:buFont typeface="Arial"/>
+              <a:buNone/>
+            </a:pPr>
+            <a:r>
+              <a:t/>
+            </a:r>
+            <a:endParaRPr sz="2000">
+              <a:solidFill>
+                <a:schemeClr val="dk1"/>
+              </a:solidFill>
+              <a:latin typeface="Arial"/>
+              <a:ea typeface="Arial"/>
+              <a:cs typeface="Arial"/>
+              <a:sym typeface="Arial"/>
+            </a:endParaRPr>
+          </a:p>
+          <a:p>
+            <a:pPr indent="-215900" lvl="0" marL="342900" marR="0" rtl="0" algn="l">
+              <a:spcBef>
+                <a:spcPts val="0"/>
+              </a:spcBef>
+              <a:spcAft>
+                <a:spcPts val="0"/>
+              </a:spcAft>
+              <a:buClr>
+                <a:schemeClr val="dk1"/>
+              </a:buClr>
+              <a:buSzPts val="2000"/>
+              <a:buFont typeface="Arial"/>
+              <a:buNone/>
+            </a:pPr>
+            <a:r>
+              <a:t/>
+            </a:r>
+            <a:endParaRPr sz="2000">
+              <a:solidFill>
+                <a:schemeClr val="dk1"/>
+              </a:solidFill>
+              <a:latin typeface="Arial"/>
+              <a:ea typeface="Arial"/>
+              <a:cs typeface="Arial"/>
+              <a:sym typeface="Arial"/>
+            </a:endParaRPr>
+          </a:p>
+        </p:txBody>
+      </p:sp>
+    </p:spTree>
+  </p:cSld>
+  <p:clrMapOvr>
+    <a:masterClrMapping/>
+  </p:clrMapOvr>
+</p:sld>
+</file>
+
 <file path=ppt/slides/slide2.xml><?xml version="1.0" encoding="utf-8"?>
 <p:sld xmlns:a="http://schemas.openxmlformats.org/drawingml/2006/main" xmlns:r="http://schemas.openxmlformats.org/officeDocument/2006/relationships" xmlns:mc="http://schemas.openxmlformats.org/markup-compatibility/2006" xmlns:mv="urn:schemas-microsoft-com:mac:vml" xmlns:p="http://schemas.openxmlformats.org/presentationml/2006/main" xmlns:c="http://schemas.openxmlformats.org/drawingml/2006/chart" xmlns:dgm="http://schemas.openxmlformats.org/drawingml/2006/diagram" xmlns:o="urn:schemas-microsoft-com:office:office" xmlns:v="urn:schemas-microsoft-com:vml" xmlns:pvml="urn:schemas-microsoft-com:office:powerpoint" xmlns:com="http://schemas.openxmlformats.org/drawingml/2006/compatibility" xmlns:p14="http://schemas.microsoft.com/office/powerpoint/2010/main" xmlns:p15="http://schemas.microsoft.com/office/powerpoint/2012/main">
   <p:cSld>
@@ -15747,22 +16322,7 @@
             <a:endParaRPr sz="2000"/>
           </a:p>
           <a:p>
-            <a:pPr indent="0" lvl="0" marL="457200" marR="0" rtl="0" algn="l">
-              <a:spcBef>
-                <a:spcPts val="0"/>
-              </a:spcBef>
-              <a:spcAft>
-                <a:spcPts val="0"/>
-              </a:spcAft>
-              <a:buNone/>
-            </a:pPr>
-            <a:r>
-              <a:t/>
-            </a:r>
-            <a:endParaRPr sz="2000"/>
-          </a:p>
-          <a:p>
-            <a:pPr indent="0" lvl="0" marL="457200" marR="0" rtl="0" algn="l">
+            <a:pPr indent="0" lvl="0" marL="0" marR="0" rtl="0" algn="l">
               <a:spcBef>
                 <a:spcPts val="0"/>
               </a:spcBef>
@@ -15844,13 +16404,46 @@
             </a:endParaRPr>
           </a:p>
           <a:p>
-            <a:pPr indent="0" lvl="0" marL="0" marR="0" rtl="0" algn="l">
-              <a:spcBef>
-                <a:spcPts val="0"/>
-              </a:spcBef>
-              <a:spcAft>
-                <a:spcPts val="0"/>
-              </a:spcAft>
+            <a:pPr indent="-342900" lvl="0" marL="342900" marR="0" rtl="0" algn="l">
+              <a:spcBef>
+                <a:spcPts val="0"/>
+              </a:spcBef>
+              <a:spcAft>
+                <a:spcPts val="0"/>
+              </a:spcAft>
+              <a:buClr>
+                <a:schemeClr val="dk1"/>
+              </a:buClr>
+              <a:buSzPts val="2000"/>
+              <a:buChar char="•"/>
+            </a:pPr>
+            <a:r>
+              <a:rPr b="1" lang="en-CA" sz="2000">
+                <a:solidFill>
+                  <a:schemeClr val="dk1"/>
+                </a:solidFill>
+              </a:rPr>
+              <a:t>Clustering</a:t>
+            </a:r>
+            <a:endParaRPr b="1" sz="2000">
+              <a:solidFill>
+                <a:schemeClr val="dk1"/>
+              </a:solidFill>
+            </a:endParaRPr>
+          </a:p>
+          <a:p>
+            <a:pPr indent="0" lvl="0" marL="127000" marR="0" rtl="0" algn="l">
+              <a:spcBef>
+                <a:spcPts val="0"/>
+              </a:spcBef>
+              <a:spcAft>
+                <a:spcPts val="0"/>
+              </a:spcAft>
+              <a:buClr>
+                <a:schemeClr val="dk1"/>
+              </a:buClr>
+              <a:buSzPts val="2000"/>
+              <a:buFont typeface="Arial"/>
               <a:buNone/>
             </a:pPr>
             <a:r>
@@ -15863,35 +16456,7 @@
             </a:endParaRPr>
           </a:p>
           <a:p>
-            <a:pPr indent="-342900" lvl="0" marL="342900" marR="0" rtl="0" algn="l">
-              <a:spcBef>
-                <a:spcPts val="0"/>
-              </a:spcBef>
-              <a:spcAft>
-                <a:spcPts val="0"/>
-              </a:spcAft>
-              <a:buClr>
-                <a:schemeClr val="dk1"/>
-              </a:buClr>
-              <a:buSzPts val="2000"/>
-              <a:buChar char="•"/>
-            </a:pPr>
-            <a:r>
-              <a:rPr b="1" lang="en-CA" sz="2000">
-                <a:solidFill>
-                  <a:schemeClr val="dk1"/>
-                </a:solidFill>
-              </a:rPr>
-              <a:t>Clustering</a:t>
-            </a:r>
-            <a:endParaRPr b="1" sz="2000">
-              <a:solidFill>
-                <a:schemeClr val="dk1"/>
-              </a:solidFill>
-            </a:endParaRPr>
-          </a:p>
-          <a:p>
-            <a:pPr indent="0" lvl="0" marL="127000" marR="0" rtl="0" algn="l">
+            <a:pPr indent="0" lvl="0" marL="0" marR="0" rtl="0" algn="l">
               <a:spcBef>
                 <a:spcPts val="0"/>
               </a:spcBef>
@@ -15915,7 +16480,7 @@
             </a:endParaRPr>
           </a:p>
           <a:p>
-            <a:pPr indent="0" lvl="0" marL="127000" marR="0" rtl="0" algn="l">
+            <a:pPr indent="-342900" lvl="0" marL="342900" marR="0" rtl="0" algn="l">
               <a:spcBef>
                 <a:spcPts val="0"/>
               </a:spcBef>
@@ -15927,6 +16492,30 @@
               </a:buClr>
               <a:buSzPts val="2000"/>
               <a:buFont typeface="Arial"/>
+              <a:buChar char="•"/>
+            </a:pPr>
+            <a:r>
+              <a:rPr b="1" lang="en-CA" sz="2000">
+                <a:solidFill>
+                  <a:schemeClr val="dk1"/>
+                </a:solidFill>
+              </a:rPr>
+              <a:t>Results</a:t>
+            </a:r>
+            <a:endParaRPr b="1" sz="2000">
+              <a:solidFill>
+                <a:schemeClr val="dk1"/>
+              </a:solidFill>
+            </a:endParaRPr>
+          </a:p>
+          <a:p>
+            <a:pPr indent="0" lvl="0" marL="0" marR="0" rtl="0" algn="l">
+              <a:spcBef>
+                <a:spcPts val="0"/>
+              </a:spcBef>
+              <a:spcAft>
+                <a:spcPts val="0"/>
+              </a:spcAft>
               <a:buNone/>
             </a:pPr>
             <a:r>
@@ -15939,18 +16528,13 @@
             </a:endParaRPr>
           </a:p>
           <a:p>
-            <a:pPr indent="-215900" lvl="0" marL="342900" marR="0" rtl="0" algn="l">
-              <a:spcBef>
-                <a:spcPts val="0"/>
-              </a:spcBef>
-              <a:spcAft>
-                <a:spcPts val="0"/>
-              </a:spcAft>
-              <a:buClr>
-                <a:schemeClr val="dk1"/>
-              </a:buClr>
-              <a:buSzPts val="2000"/>
-              <a:buFont typeface="Arial"/>
+            <a:pPr indent="0" lvl="0" marL="0" marR="0" rtl="0" algn="l">
+              <a:spcBef>
+                <a:spcPts val="0"/>
+              </a:spcBef>
+              <a:spcAft>
+                <a:spcPts val="0"/>
+              </a:spcAft>
               <a:buNone/>
             </a:pPr>
             <a:r>
@@ -15974,7 +16558,6 @@
                 <a:schemeClr val="dk1"/>
               </a:buClr>
               <a:buSzPts val="2000"/>
-              <a:buFont typeface="Arial"/>
               <a:buChar char="•"/>
             </a:pPr>
             <a:r>
@@ -15983,28 +16566,13 @@
                   <a:schemeClr val="dk1"/>
                 </a:solidFill>
               </a:rPr>
-              <a:t>Results</a:t>
+              <a:t>Next steps</a:t>
             </a:r>
             <a:endParaRPr b="1" sz="2000">
               <a:solidFill>
                 <a:schemeClr val="dk1"/>
               </a:solidFill>
             </a:endParaRPr>
-          </a:p>
-          <a:p>
-            <a:pPr indent="0" lvl="0" marL="0" marR="0" rtl="0" algn="l">
-              <a:spcBef>
-                <a:spcPts val="0"/>
-              </a:spcBef>
-              <a:spcAft>
-                <a:spcPts val="0"/>
-              </a:spcAft>
-              <a:buNone/>
-            </a:pPr>
-            <a:r>
-              <a:t/>
-            </a:r>
-            <a:endParaRPr sz="2000"/>
           </a:p>
         </p:txBody>
       </p:sp>
@@ -20519,7 +21087,7 @@
 <file path=ppt/theme/theme1.xml><?xml version="1.0" encoding="utf-8"?>
 <a:theme xmlns:a="http://schemas.openxmlformats.org/drawingml/2006/main" xmlns:r="http://schemas.openxmlformats.org/officeDocument/2006/relationships" name="Office Theme">
   <a:themeElements>
-    <a:clrScheme name="Office Theme">
+    <a:clrScheme name="Office">
       <a:dk1>
         <a:srgbClr val="000000"/>
       </a:dk1>
@@ -20798,7 +21366,7 @@
 <file path=ppt/theme/theme2.xml><?xml version="1.0" encoding="utf-8"?>
 <a:theme xmlns:a="http://schemas.openxmlformats.org/drawingml/2006/main" xmlns:r="http://schemas.openxmlformats.org/officeDocument/2006/relationships" name="Office Theme">
   <a:themeElements>
-    <a:clrScheme name="Office">
+    <a:clrScheme name="Office Theme">
       <a:dk1>
         <a:srgbClr val="000000"/>
       </a:dk1>

</xml_diff>

<commit_message>
last minute update to the slides
</commit_message>
<xml_diff>
--- a/Slides/OF_200218_GREEKC.pptx
+++ b/Slides/OF_200218_GREEKC.pptx
@@ -254,7 +254,7 @@
   </p:defaultTextStyle>
   <p:extLst>
     <p:ext uri="http://customooxmlschemas.google.com/">
-      <go:slidesCustomData xmlns:go="http://customooxmlschemas.google.com/" r:id="rId17" roundtripDataSignature="AMtx7miH3FGHtsa2LhIZCgXZTc3PwQb2cw=="/>
+      <go:slidesCustomData xmlns:go="http://customooxmlschemas.google.com/" r:id="rId17" roundtripDataSignature="AMtx7mhKn65b53Byu+PHkuubXBQrGQ3xsA=="/>
     </p:ext>
   </p:extLst>
 </p:presentation>
@@ -1598,7 +1598,7 @@
   <p:cSld>
     <p:spTree>
       <p:nvGrpSpPr>
-        <p:cNvPr id="193" name="Shape 193"/>
+        <p:cNvPr id="191" name="Shape 191"/>
         <p:cNvGrpSpPr/>
         <p:nvPr/>
       </p:nvGrpSpPr>
@@ -1612,7 +1612,7 @@
       </p:grpSpPr>
       <p:sp>
         <p:nvSpPr>
-          <p:cNvPr id="194" name="Google Shape;194;g7e530ecb0e_2_82:notes"/>
+          <p:cNvPr id="192" name="Google Shape;192;g7e530ecb0e_2_82:notes"/>
           <p:cNvSpPr/>
           <p:nvPr>
             <p:ph idx="2" type="sldImg"/>
@@ -1657,7 +1657,7 @@
       </p:sp>
       <p:sp>
         <p:nvSpPr>
-          <p:cNvPr id="195" name="Google Shape;195;g7e530ecb0e_2_82:notes"/>
+          <p:cNvPr id="193" name="Google Shape;193;g7e530ecb0e_2_82:notes"/>
           <p:cNvSpPr txBox="1"/>
           <p:nvPr>
             <p:ph idx="1" type="body"/>
@@ -1708,7 +1708,7 @@
       </p:sp>
       <p:sp>
         <p:nvSpPr>
-          <p:cNvPr id="196" name="Google Shape;196;g7e530ecb0e_2_82:notes"/>
+          <p:cNvPr id="194" name="Google Shape;194;g7e530ecb0e_2_82:notes"/>
           <p:cNvSpPr txBox="1"/>
           <p:nvPr>
             <p:ph idx="12" type="sldNum"/>
@@ -1763,7 +1763,7 @@
   <p:cSld>
     <p:spTree>
       <p:nvGrpSpPr>
-        <p:cNvPr id="202" name="Shape 202"/>
+        <p:cNvPr id="200" name="Shape 200"/>
         <p:cNvGrpSpPr/>
         <p:nvPr/>
       </p:nvGrpSpPr>
@@ -1777,7 +1777,7 @@
       </p:grpSpPr>
       <p:sp>
         <p:nvSpPr>
-          <p:cNvPr id="203" name="Google Shape;203;g7e530ecb0e_2_90:notes"/>
+          <p:cNvPr id="201" name="Google Shape;201;g7e530ecb0e_2_90:notes"/>
           <p:cNvSpPr/>
           <p:nvPr>
             <p:ph idx="2" type="sldImg"/>
@@ -1822,7 +1822,7 @@
       </p:sp>
       <p:sp>
         <p:nvSpPr>
-          <p:cNvPr id="204" name="Google Shape;204;g7e530ecb0e_2_90:notes"/>
+          <p:cNvPr id="202" name="Google Shape;202;g7e530ecb0e_2_90:notes"/>
           <p:cNvSpPr txBox="1"/>
           <p:nvPr>
             <p:ph idx="1" type="body"/>
@@ -1873,7 +1873,7 @@
       </p:sp>
       <p:sp>
         <p:nvSpPr>
-          <p:cNvPr id="205" name="Google Shape;205;g7e530ecb0e_2_90:notes"/>
+          <p:cNvPr id="203" name="Google Shape;203;g7e530ecb0e_2_90:notes"/>
           <p:cNvSpPr txBox="1"/>
           <p:nvPr>
             <p:ph idx="12" type="sldNum"/>
@@ -1928,7 +1928,7 @@
   <p:cSld>
     <p:spTree>
       <p:nvGrpSpPr>
-        <p:cNvPr id="211" name="Shape 211"/>
+        <p:cNvPr id="209" name="Shape 209"/>
         <p:cNvGrpSpPr/>
         <p:nvPr/>
       </p:nvGrpSpPr>
@@ -1942,7 +1942,7 @@
       </p:grpSpPr>
       <p:sp>
         <p:nvSpPr>
-          <p:cNvPr id="212" name="Google Shape;212;g7e530ecb0e_4_27:notes"/>
+          <p:cNvPr id="210" name="Google Shape;210;g7e530ecb0e_4_27:notes"/>
           <p:cNvSpPr/>
           <p:nvPr>
             <p:ph idx="2" type="sldImg"/>
@@ -1987,7 +1987,7 @@
       </p:sp>
       <p:sp>
         <p:nvSpPr>
-          <p:cNvPr id="213" name="Google Shape;213;g7e530ecb0e_4_27:notes"/>
+          <p:cNvPr id="211" name="Google Shape;211;g7e530ecb0e_4_27:notes"/>
           <p:cNvSpPr txBox="1"/>
           <p:nvPr>
             <p:ph idx="1" type="body"/>
@@ -2038,7 +2038,7 @@
       </p:sp>
       <p:sp>
         <p:nvSpPr>
-          <p:cNvPr id="214" name="Google Shape;214;g7e530ecb0e_4_27:notes"/>
+          <p:cNvPr id="212" name="Google Shape;212;g7e530ecb0e_4_27:notes"/>
           <p:cNvSpPr txBox="1"/>
           <p:nvPr>
             <p:ph idx="12" type="sldNum"/>
@@ -2753,7 +2753,7 @@
   <p:cSld>
     <p:spTree>
       <p:nvGrpSpPr>
-        <p:cNvPr id="157" name="Shape 157"/>
+        <p:cNvPr id="155" name="Shape 155"/>
         <p:cNvGrpSpPr/>
         <p:nvPr/>
       </p:nvGrpSpPr>
@@ -2767,7 +2767,7 @@
       </p:grpSpPr>
       <p:sp>
         <p:nvSpPr>
-          <p:cNvPr id="158" name="Google Shape;158;g7e530ecb0e_4_17:notes"/>
+          <p:cNvPr id="156" name="Google Shape;156;g7e530ecb0e_4_17:notes"/>
           <p:cNvSpPr/>
           <p:nvPr>
             <p:ph idx="2" type="sldImg"/>
@@ -2812,7 +2812,7 @@
       </p:sp>
       <p:sp>
         <p:nvSpPr>
-          <p:cNvPr id="159" name="Google Shape;159;g7e530ecb0e_4_17:notes"/>
+          <p:cNvPr id="157" name="Google Shape;157;g7e530ecb0e_4_17:notes"/>
           <p:cNvSpPr txBox="1"/>
           <p:nvPr>
             <p:ph idx="1" type="body"/>
@@ -2863,7 +2863,7 @@
       </p:sp>
       <p:sp>
         <p:nvSpPr>
-          <p:cNvPr id="160" name="Google Shape;160;g7e530ecb0e_4_17:notes"/>
+          <p:cNvPr id="158" name="Google Shape;158;g7e530ecb0e_4_17:notes"/>
           <p:cNvSpPr txBox="1"/>
           <p:nvPr>
             <p:ph idx="12" type="sldNum"/>
@@ -2918,7 +2918,7 @@
   <p:cSld>
     <p:spTree>
       <p:nvGrpSpPr>
-        <p:cNvPr id="166" name="Shape 166"/>
+        <p:cNvPr id="164" name="Shape 164"/>
         <p:cNvGrpSpPr/>
         <p:nvPr/>
       </p:nvGrpSpPr>
@@ -2932,7 +2932,7 @@
       </p:grpSpPr>
       <p:sp>
         <p:nvSpPr>
-          <p:cNvPr id="167" name="Google Shape;167;p9:notes"/>
+          <p:cNvPr id="165" name="Google Shape;165;p9:notes"/>
           <p:cNvSpPr/>
           <p:nvPr>
             <p:ph idx="2" type="sldImg"/>
@@ -2977,7 +2977,7 @@
       </p:sp>
       <p:sp>
         <p:nvSpPr>
-          <p:cNvPr id="168" name="Google Shape;168;p9:notes"/>
+          <p:cNvPr id="166" name="Google Shape;166;p9:notes"/>
           <p:cNvSpPr txBox="1"/>
           <p:nvPr>
             <p:ph idx="1" type="body"/>
@@ -3028,7 +3028,7 @@
       </p:sp>
       <p:sp>
         <p:nvSpPr>
-          <p:cNvPr id="169" name="Google Shape;169;p9:notes"/>
+          <p:cNvPr id="167" name="Google Shape;167;p9:notes"/>
           <p:cNvSpPr txBox="1"/>
           <p:nvPr>
             <p:ph idx="12" type="sldNum"/>
@@ -3083,7 +3083,7 @@
   <p:cSld>
     <p:spTree>
       <p:nvGrpSpPr>
-        <p:cNvPr id="175" name="Shape 175"/>
+        <p:cNvPr id="173" name="Shape 173"/>
         <p:cNvGrpSpPr/>
         <p:nvPr/>
       </p:nvGrpSpPr>
@@ -3097,7 +3097,7 @@
       </p:grpSpPr>
       <p:sp>
         <p:nvSpPr>
-          <p:cNvPr id="176" name="Google Shape;176;g7e530ecb0e_2_5:notes"/>
+          <p:cNvPr id="174" name="Google Shape;174;g7e530ecb0e_2_5:notes"/>
           <p:cNvSpPr/>
           <p:nvPr>
             <p:ph idx="2" type="sldImg"/>
@@ -3142,7 +3142,7 @@
       </p:sp>
       <p:sp>
         <p:nvSpPr>
-          <p:cNvPr id="177" name="Google Shape;177;g7e530ecb0e_2_5:notes"/>
+          <p:cNvPr id="175" name="Google Shape;175;g7e530ecb0e_2_5:notes"/>
           <p:cNvSpPr txBox="1"/>
           <p:nvPr>
             <p:ph idx="1" type="body"/>
@@ -3193,7 +3193,7 @@
       </p:sp>
       <p:sp>
         <p:nvSpPr>
-          <p:cNvPr id="178" name="Google Shape;178;g7e530ecb0e_2_5:notes"/>
+          <p:cNvPr id="176" name="Google Shape;176;g7e530ecb0e_2_5:notes"/>
           <p:cNvSpPr txBox="1"/>
           <p:nvPr>
             <p:ph idx="12" type="sldNum"/>
@@ -3248,7 +3248,7 @@
   <p:cSld>
     <p:spTree>
       <p:nvGrpSpPr>
-        <p:cNvPr id="184" name="Shape 184"/>
+        <p:cNvPr id="182" name="Shape 182"/>
         <p:cNvGrpSpPr/>
         <p:nvPr/>
       </p:nvGrpSpPr>
@@ -3262,7 +3262,7 @@
       </p:grpSpPr>
       <p:sp>
         <p:nvSpPr>
-          <p:cNvPr id="185" name="Google Shape;185;g7e530ecb0e_2_69:notes"/>
+          <p:cNvPr id="183" name="Google Shape;183;g7e530ecb0e_2_69:notes"/>
           <p:cNvSpPr/>
           <p:nvPr>
             <p:ph idx="2" type="sldImg"/>
@@ -3307,7 +3307,7 @@
       </p:sp>
       <p:sp>
         <p:nvSpPr>
-          <p:cNvPr id="186" name="Google Shape;186;g7e530ecb0e_2_69:notes"/>
+          <p:cNvPr id="184" name="Google Shape;184;g7e530ecb0e_2_69:notes"/>
           <p:cNvSpPr txBox="1"/>
           <p:nvPr>
             <p:ph idx="1" type="body"/>
@@ -3358,7 +3358,7 @@
       </p:sp>
       <p:sp>
         <p:nvSpPr>
-          <p:cNvPr id="187" name="Google Shape;187;g7e530ecb0e_2_69:notes"/>
+          <p:cNvPr id="185" name="Google Shape;185;g7e530ecb0e_2_69:notes"/>
           <p:cNvSpPr txBox="1"/>
           <p:nvPr>
             <p:ph idx="12" type="sldNum"/>
@@ -14324,7 +14324,7 @@
   <p:cSld>
     <p:spTree>
       <p:nvGrpSpPr>
-        <p:cNvPr id="197" name="Shape 197"/>
+        <p:cNvPr id="195" name="Shape 195"/>
         <p:cNvGrpSpPr/>
         <p:nvPr/>
       </p:nvGrpSpPr>
@@ -14338,7 +14338,7 @@
       </p:grpSpPr>
       <p:cxnSp>
         <p:nvCxnSpPr>
-          <p:cNvPr id="198" name="Google Shape;198;g7e530ecb0e_2_82"/>
+          <p:cNvPr id="196" name="Google Shape;196;g7e530ecb0e_2_82"/>
           <p:cNvCxnSpPr/>
           <p:nvPr/>
         </p:nvCxnSpPr>
@@ -14364,7 +14364,7 @@
       </p:cxnSp>
       <p:sp>
         <p:nvSpPr>
-          <p:cNvPr id="199" name="Google Shape;199;g7e530ecb0e_2_82"/>
+          <p:cNvPr id="197" name="Google Shape;197;g7e530ecb0e_2_82"/>
           <p:cNvSpPr txBox="1"/>
           <p:nvPr/>
         </p:nvSpPr>
@@ -14410,7 +14410,7 @@
       </p:sp>
       <p:sp>
         <p:nvSpPr>
-          <p:cNvPr id="200" name="Google Shape;200;g7e530ecb0e_2_82"/>
+          <p:cNvPr id="198" name="Google Shape;198;g7e530ecb0e_2_82"/>
           <p:cNvSpPr txBox="1"/>
           <p:nvPr>
             <p:ph idx="12" type="sldNum"/>
@@ -14454,7 +14454,7 @@
       </p:sp>
       <p:sp>
         <p:nvSpPr>
-          <p:cNvPr id="201" name="Google Shape;201;g7e530ecb0e_2_82"/>
+          <p:cNvPr id="199" name="Google Shape;199;g7e530ecb0e_2_82"/>
           <p:cNvSpPr txBox="1"/>
           <p:nvPr/>
         </p:nvSpPr>
@@ -14927,7 +14927,7 @@
   <p:cSld>
     <p:spTree>
       <p:nvGrpSpPr>
-        <p:cNvPr id="206" name="Shape 206"/>
+        <p:cNvPr id="204" name="Shape 204"/>
         <p:cNvGrpSpPr/>
         <p:nvPr/>
       </p:nvGrpSpPr>
@@ -14941,7 +14941,7 @@
       </p:grpSpPr>
       <p:cxnSp>
         <p:nvCxnSpPr>
-          <p:cNvPr id="207" name="Google Shape;207;g7e530ecb0e_2_90"/>
+          <p:cNvPr id="205" name="Google Shape;205;g7e530ecb0e_2_90"/>
           <p:cNvCxnSpPr/>
           <p:nvPr/>
         </p:nvCxnSpPr>
@@ -14967,7 +14967,7 @@
       </p:cxnSp>
       <p:sp>
         <p:nvSpPr>
-          <p:cNvPr id="208" name="Google Shape;208;g7e530ecb0e_2_90"/>
+          <p:cNvPr id="206" name="Google Shape;206;g7e530ecb0e_2_90"/>
           <p:cNvSpPr txBox="1"/>
           <p:nvPr/>
         </p:nvSpPr>
@@ -15013,7 +15013,7 @@
       </p:sp>
       <p:sp>
         <p:nvSpPr>
-          <p:cNvPr id="209" name="Google Shape;209;g7e530ecb0e_2_90"/>
+          <p:cNvPr id="207" name="Google Shape;207;g7e530ecb0e_2_90"/>
           <p:cNvSpPr txBox="1"/>
           <p:nvPr>
             <p:ph idx="12" type="sldNum"/>
@@ -15057,7 +15057,7 @@
       </p:sp>
       <p:sp>
         <p:nvSpPr>
-          <p:cNvPr id="210" name="Google Shape;210;g7e530ecb0e_2_90"/>
+          <p:cNvPr id="208" name="Google Shape;208;g7e530ecb0e_2_90"/>
           <p:cNvSpPr txBox="1"/>
           <p:nvPr/>
         </p:nvSpPr>
@@ -15526,7 +15526,7 @@
   <p:cSld>
     <p:spTree>
       <p:nvGrpSpPr>
-        <p:cNvPr id="215" name="Shape 215"/>
+        <p:cNvPr id="213" name="Shape 213"/>
         <p:cNvGrpSpPr/>
         <p:nvPr/>
       </p:nvGrpSpPr>
@@ -15540,7 +15540,7 @@
       </p:grpSpPr>
       <p:cxnSp>
         <p:nvCxnSpPr>
-          <p:cNvPr id="216" name="Google Shape;216;g7e530ecb0e_4_27"/>
+          <p:cNvPr id="214" name="Google Shape;214;g7e530ecb0e_4_27"/>
           <p:cNvCxnSpPr/>
           <p:nvPr/>
         </p:nvCxnSpPr>
@@ -15566,7 +15566,7 @@
       </p:cxnSp>
       <p:sp>
         <p:nvSpPr>
-          <p:cNvPr id="217" name="Google Shape;217;g7e530ecb0e_4_27"/>
+          <p:cNvPr id="215" name="Google Shape;215;g7e530ecb0e_4_27"/>
           <p:cNvSpPr txBox="1"/>
           <p:nvPr/>
         </p:nvSpPr>
@@ -15612,7 +15612,7 @@
       </p:sp>
       <p:sp>
         <p:nvSpPr>
-          <p:cNvPr id="218" name="Google Shape;218;g7e530ecb0e_4_27"/>
+          <p:cNvPr id="216" name="Google Shape;216;g7e530ecb0e_4_27"/>
           <p:cNvSpPr txBox="1"/>
           <p:nvPr>
             <p:ph idx="12" type="sldNum"/>
@@ -15656,7 +15656,7 @@
       </p:sp>
       <p:sp>
         <p:nvSpPr>
-          <p:cNvPr id="219" name="Google Shape;219;g7e530ecb0e_4_27"/>
+          <p:cNvPr id="217" name="Google Shape;217;g7e530ecb0e_4_27"/>
           <p:cNvSpPr txBox="1"/>
           <p:nvPr/>
         </p:nvSpPr>
@@ -17269,315 +17269,78 @@
           </a:p>
         </p:txBody>
       </p:sp>
+      <p:cxnSp>
+        <p:nvCxnSpPr>
+          <p:cNvPr id="134" name="Google Shape;134;p7"/>
+          <p:cNvCxnSpPr/>
+          <p:nvPr/>
+        </p:nvCxnSpPr>
+        <p:spPr>
+          <a:xfrm rot="10800000">
+            <a:off x="4023416" y="4211829"/>
+            <a:ext cx="3248100" cy="0"/>
+          </a:xfrm>
+          <a:prstGeom prst="straightConnector1">
+            <a:avLst/>
+          </a:prstGeom>
+          <a:noFill/>
+          <a:ln cap="flat" cmpd="sng" w="12700">
+            <a:solidFill>
+              <a:schemeClr val="dk1"/>
+            </a:solidFill>
+            <a:prstDash val="solid"/>
+            <a:miter lim="800000"/>
+            <a:headEnd len="med" w="med" type="stealth"/>
+            <a:tailEnd len="sm" w="sm" type="none"/>
+          </a:ln>
+        </p:spPr>
+      </p:cxnSp>
       <p:grpSp>
         <p:nvGrpSpPr>
-          <p:cNvPr id="134" name="Google Shape;134;p7"/>
+          <p:cNvPr id="135" name="Google Shape;135;p7"/>
           <p:cNvGrpSpPr/>
           <p:nvPr/>
         </p:nvGrpSpPr>
         <p:grpSpPr>
           <a:xfrm>
-            <a:off x="839787" y="1400325"/>
-            <a:ext cx="7875973" cy="4675544"/>
-            <a:chOff x="839787" y="1149406"/>
-            <a:chExt cx="7875973" cy="4675544"/>
+            <a:off x="3763659" y="5085868"/>
+            <a:ext cx="3455939" cy="990000"/>
+            <a:chOff x="3611259" y="5220912"/>
+            <a:chExt cx="3455939" cy="990000"/>
           </a:xfrm>
         </p:grpSpPr>
-        <p:cxnSp>
-          <p:nvCxnSpPr>
-            <p:cNvPr id="135" name="Google Shape;135;p7"/>
-            <p:cNvCxnSpPr/>
-            <p:nvPr/>
-          </p:nvCxnSpPr>
-          <p:spPr>
-            <a:xfrm rot="10800000">
-              <a:off x="4023416" y="3960910"/>
-              <a:ext cx="3248100" cy="0"/>
-            </a:xfrm>
-            <a:prstGeom prst="straightConnector1">
-              <a:avLst/>
-            </a:prstGeom>
-            <a:noFill/>
-            <a:ln cap="flat" cmpd="sng" w="12700">
-              <a:solidFill>
-                <a:schemeClr val="dk1"/>
-              </a:solidFill>
-              <a:prstDash val="solid"/>
-              <a:miter lim="800000"/>
-              <a:headEnd len="med" w="med" type="stealth"/>
-              <a:tailEnd len="sm" w="sm" type="none"/>
-            </a:ln>
-          </p:spPr>
-        </p:cxnSp>
-        <p:grpSp>
-          <p:nvGrpSpPr>
-            <p:cNvPr id="136" name="Google Shape;136;p7"/>
-            <p:cNvGrpSpPr/>
-            <p:nvPr/>
-          </p:nvGrpSpPr>
-          <p:grpSpPr>
-            <a:xfrm>
-              <a:off x="3763659" y="4834950"/>
-              <a:ext cx="3455939" cy="990000"/>
-              <a:chOff x="3611259" y="5220912"/>
-              <a:chExt cx="3455939" cy="990000"/>
-            </a:xfrm>
-          </p:grpSpPr>
-          <p:sp>
-            <p:nvSpPr>
-              <p:cNvPr id="137" name="Google Shape;137;p7"/>
-              <p:cNvSpPr/>
-              <p:nvPr/>
-            </p:nvSpPr>
-            <p:spPr>
-              <a:xfrm>
-                <a:off x="3611259" y="5220912"/>
-                <a:ext cx="990000" cy="990000"/>
-              </a:xfrm>
-              <a:prstGeom prst="can">
-                <a:avLst>
-                  <a:gd fmla="val 25000" name="adj"/>
-                </a:avLst>
-              </a:prstGeom>
-              <a:solidFill>
-                <a:schemeClr val="accent1"/>
-              </a:solidFill>
-              <a:ln cap="flat" cmpd="sng" w="12700">
-                <a:solidFill>
-                  <a:srgbClr val="31538F"/>
-                </a:solidFill>
-                <a:prstDash val="solid"/>
-                <a:miter lim="800000"/>
-                <a:headEnd len="sm" w="sm" type="none"/>
-                <a:tailEnd len="sm" w="sm" type="none"/>
-              </a:ln>
-            </p:spPr>
-            <p:txBody>
-              <a:bodyPr anchorCtr="0" anchor="ctr" bIns="45700" lIns="91425" spcFirstLastPara="1" rIns="91425" wrap="square" tIns="45700">
-                <a:noAutofit/>
-              </a:bodyPr>
-              <a:lstStyle/>
-              <a:p>
-                <a:pPr indent="0" lvl="0" marL="0" marR="0" rtl="0" algn="ctr">
-                  <a:spcBef>
-                    <a:spcPts val="0"/>
-                  </a:spcBef>
-                  <a:spcAft>
-                    <a:spcPts val="0"/>
-                  </a:spcAft>
-                  <a:buNone/>
-                </a:pPr>
-                <a:r>
-                  <a:rPr lang="en-CA" sz="1600">
-                    <a:solidFill>
-                      <a:schemeClr val="lt1"/>
-                    </a:solidFill>
-                  </a:rPr>
-                  <a:t>JASPAR</a:t>
-                </a:r>
-                <a:endParaRPr sz="1600">
-                  <a:solidFill>
-                    <a:schemeClr val="lt1"/>
-                  </a:solidFill>
-                </a:endParaRPr>
-              </a:p>
-              <a:p>
-                <a:pPr indent="0" lvl="0" marL="0" marR="0" rtl="0" algn="ctr">
-                  <a:spcBef>
-                    <a:spcPts val="0"/>
-                  </a:spcBef>
-                  <a:spcAft>
-                    <a:spcPts val="0"/>
-                  </a:spcAft>
-                  <a:buNone/>
-                </a:pPr>
-                <a:r>
-                  <a:rPr lang="en-CA" sz="1600">
-                    <a:solidFill>
-                      <a:schemeClr val="lt1"/>
-                    </a:solidFill>
-                  </a:rPr>
-                  <a:t>2020</a:t>
-                </a:r>
-                <a:endParaRPr sz="1600">
-                  <a:solidFill>
-                    <a:schemeClr val="lt1"/>
-                  </a:solidFill>
-                </a:endParaRPr>
-              </a:p>
-            </p:txBody>
-          </p:sp>
-          <p:sp>
-            <p:nvSpPr>
-              <p:cNvPr id="138" name="Google Shape;138;p7"/>
-              <p:cNvSpPr/>
-              <p:nvPr/>
-            </p:nvSpPr>
-            <p:spPr>
-              <a:xfrm>
-                <a:off x="4844229" y="5220912"/>
-                <a:ext cx="990000" cy="990000"/>
-              </a:xfrm>
-              <a:prstGeom prst="can">
-                <a:avLst>
-                  <a:gd fmla="val 25000" name="adj"/>
-                </a:avLst>
-              </a:prstGeom>
-              <a:solidFill>
-                <a:schemeClr val="accent1"/>
-              </a:solidFill>
-              <a:ln cap="flat" cmpd="sng" w="12700">
-                <a:solidFill>
-                  <a:srgbClr val="31538F"/>
-                </a:solidFill>
-                <a:prstDash val="solid"/>
-                <a:miter lim="800000"/>
-                <a:headEnd len="sm" w="sm" type="none"/>
-                <a:tailEnd len="sm" w="sm" type="none"/>
-              </a:ln>
-            </p:spPr>
-            <p:txBody>
-              <a:bodyPr anchorCtr="0" anchor="ctr" bIns="45700" lIns="91425" spcFirstLastPara="1" rIns="91425" wrap="square" tIns="45700">
-                <a:noAutofit/>
-              </a:bodyPr>
-              <a:lstStyle/>
-              <a:p>
-                <a:pPr indent="0" lvl="0" marL="0" rtl="0" algn="ctr">
-                  <a:spcBef>
-                    <a:spcPts val="0"/>
-                  </a:spcBef>
-                  <a:spcAft>
-                    <a:spcPts val="0"/>
-                  </a:spcAft>
-                  <a:buClr>
-                    <a:schemeClr val="dk1"/>
-                  </a:buClr>
-                  <a:buFont typeface="Arial"/>
-                  <a:buNone/>
-                </a:pPr>
-                <a:r>
-                  <a:rPr lang="en-CA" sz="1000">
-                    <a:solidFill>
-                      <a:schemeClr val="lt1"/>
-                    </a:solidFill>
-                  </a:rPr>
-                  <a:t>HOCOMOCO</a:t>
-                </a:r>
-                <a:endParaRPr sz="1000">
-                  <a:solidFill>
-                    <a:schemeClr val="lt1"/>
-                  </a:solidFill>
-                </a:endParaRPr>
-              </a:p>
-              <a:p>
-                <a:pPr indent="0" lvl="0" marL="0" rtl="0" algn="ctr">
-                  <a:spcBef>
-                    <a:spcPts val="0"/>
-                  </a:spcBef>
-                  <a:spcAft>
-                    <a:spcPts val="0"/>
-                  </a:spcAft>
-                  <a:buClr>
-                    <a:schemeClr val="dk1"/>
-                  </a:buClr>
-                  <a:buFont typeface="Arial"/>
-                  <a:buNone/>
-                </a:pPr>
-                <a:r>
-                  <a:rPr lang="en-CA" sz="1000">
-                    <a:solidFill>
-                      <a:schemeClr val="lt1"/>
-                    </a:solidFill>
-                  </a:rPr>
-                  <a:t>(v11)</a:t>
-                </a:r>
-                <a:endParaRPr sz="1200">
-                  <a:solidFill>
-                    <a:schemeClr val="lt1"/>
-                  </a:solidFill>
-                </a:endParaRPr>
-              </a:p>
-            </p:txBody>
-          </p:sp>
-          <p:sp>
-            <p:nvSpPr>
-              <p:cNvPr id="139" name="Google Shape;139;p7"/>
-              <p:cNvSpPr/>
-              <p:nvPr/>
-            </p:nvSpPr>
-            <p:spPr>
-              <a:xfrm>
-                <a:off x="6077198" y="5220912"/>
-                <a:ext cx="990000" cy="990000"/>
-              </a:xfrm>
-              <a:prstGeom prst="can">
-                <a:avLst>
-                  <a:gd fmla="val 25000" name="adj"/>
-                </a:avLst>
-              </a:prstGeom>
-              <a:solidFill>
-                <a:schemeClr val="accent1"/>
-              </a:solidFill>
-              <a:ln cap="flat" cmpd="sng" w="12700">
-                <a:solidFill>
-                  <a:srgbClr val="31538F"/>
-                </a:solidFill>
-                <a:prstDash val="solid"/>
-                <a:miter lim="800000"/>
-                <a:headEnd len="sm" w="sm" type="none"/>
-                <a:tailEnd len="sm" w="sm" type="none"/>
-              </a:ln>
-            </p:spPr>
-            <p:txBody>
-              <a:bodyPr anchorCtr="0" anchor="ctr" bIns="45700" lIns="91425" spcFirstLastPara="1" rIns="91425" wrap="square" tIns="45700">
-                <a:noAutofit/>
-              </a:bodyPr>
-              <a:lstStyle/>
-              <a:p>
-                <a:pPr indent="0" lvl="0" marL="0" marR="0" rtl="0" algn="ctr">
-                  <a:spcBef>
-                    <a:spcPts val="0"/>
-                  </a:spcBef>
-                  <a:spcAft>
-                    <a:spcPts val="0"/>
-                  </a:spcAft>
-                  <a:buNone/>
-                </a:pPr>
-                <a:r>
-                  <a:rPr lang="en-CA" sz="1800">
-                    <a:solidFill>
-                      <a:schemeClr val="lt1"/>
-                    </a:solidFill>
-                  </a:rPr>
-                  <a:t>GTRD</a:t>
-                </a:r>
-                <a:endParaRPr/>
-              </a:p>
-            </p:txBody>
-          </p:sp>
-        </p:grpSp>
         <p:sp>
           <p:nvSpPr>
-            <p:cNvPr id="140" name="Google Shape;140;p7"/>
-            <p:cNvSpPr txBox="1"/>
+            <p:cNvPr id="136" name="Google Shape;136;p7"/>
+            <p:cNvSpPr/>
             <p:nvPr/>
           </p:nvSpPr>
           <p:spPr>
             <a:xfrm>
-              <a:off x="7063060" y="3807001"/>
-              <a:ext cx="1652700" cy="307800"/>
+              <a:off x="3611259" y="5220912"/>
+              <a:ext cx="990000" cy="990000"/>
             </a:xfrm>
-            <a:prstGeom prst="rect">
-              <a:avLst/>
+            <a:prstGeom prst="can">
+              <a:avLst>
+                <a:gd fmla="val 25000" name="adj"/>
+              </a:avLst>
             </a:prstGeom>
-            <a:noFill/>
-            <a:ln>
-              <a:noFill/>
+            <a:solidFill>
+              <a:schemeClr val="accent1"/>
+            </a:solidFill>
+            <a:ln cap="flat" cmpd="sng" w="12700">
+              <a:solidFill>
+                <a:srgbClr val="31538F"/>
+              </a:solidFill>
+              <a:prstDash val="solid"/>
+              <a:miter lim="800000"/>
+              <a:headEnd len="sm" w="sm" type="none"/>
+              <a:tailEnd len="sm" w="sm" type="none"/>
             </a:ln>
           </p:spPr>
           <p:txBody>
-            <a:bodyPr anchorCtr="0" anchor="t" bIns="45700" lIns="91425" spcFirstLastPara="1" rIns="91425" wrap="square" tIns="45700">
-              <a:spAutoFit/>
+            <a:bodyPr anchorCtr="0" anchor="ctr" bIns="45700" lIns="91425" spcFirstLastPara="1" rIns="91425" wrap="square" tIns="45700">
+              <a:noAutofit/>
             </a:bodyPr>
             <a:lstStyle/>
             <a:p>
@@ -17591,54 +17354,769 @@
                 <a:buNone/>
               </a:pPr>
               <a:r>
-                <a:rPr i="1" lang="en-CA">
+                <a:rPr lang="en-CA" sz="1600">
                   <a:solidFill>
-                    <a:schemeClr val="dk1"/>
+                    <a:schemeClr val="lt1"/>
                   </a:solidFill>
                 </a:rPr>
-                <a:t>annotations</a:t>
+                <a:t>JASPAR</a:t>
               </a:r>
+              <a:endParaRPr sz="1600">
+                <a:solidFill>
+                  <a:schemeClr val="lt1"/>
+                </a:solidFill>
+              </a:endParaRPr>
+            </a:p>
+            <a:p>
+              <a:pPr indent="0" lvl="0" marL="0" marR="0" rtl="0" algn="ctr">
+                <a:spcBef>
+                  <a:spcPts val="0"/>
+                </a:spcBef>
+                <a:spcAft>
+                  <a:spcPts val="0"/>
+                </a:spcAft>
+                <a:buNone/>
+              </a:pPr>
               <a:r>
-                <a:rPr i="1" lang="en-CA" sz="1400">
+                <a:rPr lang="en-CA" sz="1600">
                   <a:solidFill>
-                    <a:schemeClr val="dk1"/>
-                  </a:solidFill>
-                  <a:latin typeface="Arial"/>
-                  <a:ea typeface="Arial"/>
-                  <a:cs typeface="Arial"/>
-                  <a:sym typeface="Arial"/>
-                </a:rPr>
-                <a:t>.</a:t>
-              </a:r>
-              <a:r>
-                <a:rPr i="1" lang="en-CA">
-                  <a:solidFill>
-                    <a:schemeClr val="dk1"/>
+                    <a:schemeClr val="lt1"/>
                   </a:solidFill>
                 </a:rPr>
-                <a:t>tsv</a:t>
+                <a:t>2020</a:t>
               </a:r>
-              <a:endParaRPr i="1" sz="1400">
-                <a:solidFill>
-                  <a:schemeClr val="dk1"/>
-                </a:solidFill>
-                <a:latin typeface="Arial"/>
-                <a:ea typeface="Arial"/>
-                <a:cs typeface="Arial"/>
-                <a:sym typeface="Arial"/>
+              <a:endParaRPr sz="1600">
+                <a:solidFill>
+                  <a:schemeClr val="lt1"/>
+                </a:solidFill>
               </a:endParaRPr>
             </a:p>
           </p:txBody>
         </p:sp>
         <p:sp>
           <p:nvSpPr>
-            <p:cNvPr id="141" name="Google Shape;141;p7"/>
+            <p:cNvPr id="137" name="Google Shape;137;p7"/>
             <p:cNvSpPr/>
             <p:nvPr/>
           </p:nvSpPr>
           <p:spPr>
             <a:xfrm>
-              <a:off x="3033354" y="3465914"/>
+              <a:off x="4844229" y="5220912"/>
+              <a:ext cx="990000" cy="990000"/>
+            </a:xfrm>
+            <a:prstGeom prst="can">
+              <a:avLst>
+                <a:gd fmla="val 25000" name="adj"/>
+              </a:avLst>
+            </a:prstGeom>
+            <a:solidFill>
+              <a:schemeClr val="accent1"/>
+            </a:solidFill>
+            <a:ln cap="flat" cmpd="sng" w="12700">
+              <a:solidFill>
+                <a:srgbClr val="31538F"/>
+              </a:solidFill>
+              <a:prstDash val="solid"/>
+              <a:miter lim="800000"/>
+              <a:headEnd len="sm" w="sm" type="none"/>
+              <a:tailEnd len="sm" w="sm" type="none"/>
+            </a:ln>
+          </p:spPr>
+          <p:txBody>
+            <a:bodyPr anchorCtr="0" anchor="ctr" bIns="45700" lIns="91425" spcFirstLastPara="1" rIns="91425" wrap="square" tIns="45700">
+              <a:noAutofit/>
+            </a:bodyPr>
+            <a:lstStyle/>
+            <a:p>
+              <a:pPr indent="0" lvl="0" marL="0" rtl="0" algn="ctr">
+                <a:spcBef>
+                  <a:spcPts val="0"/>
+                </a:spcBef>
+                <a:spcAft>
+                  <a:spcPts val="0"/>
+                </a:spcAft>
+                <a:buClr>
+                  <a:schemeClr val="dk1"/>
+                </a:buClr>
+                <a:buFont typeface="Arial"/>
+                <a:buNone/>
+              </a:pPr>
+              <a:r>
+                <a:rPr lang="en-CA" sz="1000">
+                  <a:solidFill>
+                    <a:schemeClr val="lt1"/>
+                  </a:solidFill>
+                </a:rPr>
+                <a:t>HOCOMOCO</a:t>
+              </a:r>
+              <a:endParaRPr sz="1000">
+                <a:solidFill>
+                  <a:schemeClr val="lt1"/>
+                </a:solidFill>
+              </a:endParaRPr>
+            </a:p>
+            <a:p>
+              <a:pPr indent="0" lvl="0" marL="0" rtl="0" algn="ctr">
+                <a:spcBef>
+                  <a:spcPts val="0"/>
+                </a:spcBef>
+                <a:spcAft>
+                  <a:spcPts val="0"/>
+                </a:spcAft>
+                <a:buClr>
+                  <a:schemeClr val="dk1"/>
+                </a:buClr>
+                <a:buFont typeface="Arial"/>
+                <a:buNone/>
+              </a:pPr>
+              <a:r>
+                <a:rPr lang="en-CA" sz="1000">
+                  <a:solidFill>
+                    <a:schemeClr val="lt1"/>
+                  </a:solidFill>
+                </a:rPr>
+                <a:t>(v11)</a:t>
+              </a:r>
+              <a:endParaRPr sz="1200">
+                <a:solidFill>
+                  <a:schemeClr val="lt1"/>
+                </a:solidFill>
+              </a:endParaRPr>
+            </a:p>
+          </p:txBody>
+        </p:sp>
+        <p:sp>
+          <p:nvSpPr>
+            <p:cNvPr id="138" name="Google Shape;138;p7"/>
+            <p:cNvSpPr/>
+            <p:nvPr/>
+          </p:nvSpPr>
+          <p:spPr>
+            <a:xfrm>
+              <a:off x="6077198" y="5220912"/>
+              <a:ext cx="990000" cy="990000"/>
+            </a:xfrm>
+            <a:prstGeom prst="can">
+              <a:avLst>
+                <a:gd fmla="val 25000" name="adj"/>
+              </a:avLst>
+            </a:prstGeom>
+            <a:solidFill>
+              <a:schemeClr val="accent1"/>
+            </a:solidFill>
+            <a:ln cap="flat" cmpd="sng" w="12700">
+              <a:solidFill>
+                <a:srgbClr val="31538F"/>
+              </a:solidFill>
+              <a:prstDash val="solid"/>
+              <a:miter lim="800000"/>
+              <a:headEnd len="sm" w="sm" type="none"/>
+              <a:tailEnd len="sm" w="sm" type="none"/>
+            </a:ln>
+          </p:spPr>
+          <p:txBody>
+            <a:bodyPr anchorCtr="0" anchor="ctr" bIns="45700" lIns="91425" spcFirstLastPara="1" rIns="91425" wrap="square" tIns="45700">
+              <a:noAutofit/>
+            </a:bodyPr>
+            <a:lstStyle/>
+            <a:p>
+              <a:pPr indent="0" lvl="0" marL="0" marR="0" rtl="0" algn="ctr">
+                <a:spcBef>
+                  <a:spcPts val="0"/>
+                </a:spcBef>
+                <a:spcAft>
+                  <a:spcPts val="0"/>
+                </a:spcAft>
+                <a:buNone/>
+              </a:pPr>
+              <a:r>
+                <a:rPr lang="en-CA" sz="1800">
+                  <a:solidFill>
+                    <a:schemeClr val="lt1"/>
+                  </a:solidFill>
+                </a:rPr>
+                <a:t>GTRD</a:t>
+              </a:r>
+              <a:endParaRPr/>
+            </a:p>
+          </p:txBody>
+        </p:sp>
+      </p:grpSp>
+      <p:sp>
+        <p:nvSpPr>
+          <p:cNvPr id="139" name="Google Shape;139;p7"/>
+          <p:cNvSpPr txBox="1"/>
+          <p:nvPr/>
+        </p:nvSpPr>
+        <p:spPr>
+          <a:xfrm>
+            <a:off x="7063060" y="4057919"/>
+            <a:ext cx="1652700" cy="307800"/>
+          </a:xfrm>
+          <a:prstGeom prst="rect">
+            <a:avLst/>
+          </a:prstGeom>
+          <a:noFill/>
+          <a:ln>
+            <a:noFill/>
+          </a:ln>
+        </p:spPr>
+        <p:txBody>
+          <a:bodyPr anchorCtr="0" anchor="t" bIns="45700" lIns="91425" spcFirstLastPara="1" rIns="91425" wrap="square" tIns="45700">
+            <a:spAutoFit/>
+          </a:bodyPr>
+          <a:lstStyle/>
+          <a:p>
+            <a:pPr indent="0" lvl="0" marL="0" marR="0" rtl="0" algn="ctr">
+              <a:spcBef>
+                <a:spcPts val="0"/>
+              </a:spcBef>
+              <a:spcAft>
+                <a:spcPts val="0"/>
+              </a:spcAft>
+              <a:buNone/>
+            </a:pPr>
+            <a:r>
+              <a:rPr i="1" lang="en-CA">
+                <a:solidFill>
+                  <a:schemeClr val="dk1"/>
+                </a:solidFill>
+              </a:rPr>
+              <a:t>annotations</a:t>
+            </a:r>
+            <a:r>
+              <a:rPr i="1" lang="en-CA" sz="1400">
+                <a:solidFill>
+                  <a:schemeClr val="dk1"/>
+                </a:solidFill>
+                <a:latin typeface="Arial"/>
+                <a:ea typeface="Arial"/>
+                <a:cs typeface="Arial"/>
+                <a:sym typeface="Arial"/>
+              </a:rPr>
+              <a:t>.</a:t>
+            </a:r>
+            <a:r>
+              <a:rPr i="1" lang="en-CA">
+                <a:solidFill>
+                  <a:schemeClr val="dk1"/>
+                </a:solidFill>
+              </a:rPr>
+              <a:t>tsv</a:t>
+            </a:r>
+            <a:endParaRPr i="1" sz="1400">
+              <a:solidFill>
+                <a:schemeClr val="dk1"/>
+              </a:solidFill>
+              <a:latin typeface="Arial"/>
+              <a:ea typeface="Arial"/>
+              <a:cs typeface="Arial"/>
+              <a:sym typeface="Arial"/>
+            </a:endParaRPr>
+          </a:p>
+        </p:txBody>
+      </p:sp>
+      <p:sp>
+        <p:nvSpPr>
+          <p:cNvPr id="140" name="Google Shape;140;p7"/>
+          <p:cNvSpPr/>
+          <p:nvPr/>
+        </p:nvSpPr>
+        <p:spPr>
+          <a:xfrm>
+            <a:off x="3033354" y="3716833"/>
+            <a:ext cx="990000" cy="990000"/>
+          </a:xfrm>
+          <a:prstGeom prst="can">
+            <a:avLst>
+              <a:gd fmla="val 25000" name="adj"/>
+            </a:avLst>
+          </a:prstGeom>
+          <a:solidFill>
+            <a:schemeClr val="accent1"/>
+          </a:solidFill>
+          <a:ln cap="flat" cmpd="sng" w="12700">
+            <a:solidFill>
+              <a:srgbClr val="31538F"/>
+            </a:solidFill>
+            <a:prstDash val="solid"/>
+            <a:miter lim="800000"/>
+            <a:headEnd len="sm" w="sm" type="none"/>
+            <a:tailEnd len="sm" w="sm" type="none"/>
+          </a:ln>
+        </p:spPr>
+        <p:txBody>
+          <a:bodyPr anchorCtr="0" anchor="ctr" bIns="45700" lIns="91425" spcFirstLastPara="1" rIns="91425" wrap="square" tIns="45700">
+            <a:noAutofit/>
+          </a:bodyPr>
+          <a:lstStyle/>
+          <a:p>
+            <a:pPr indent="0" lvl="0" marL="0" marR="0" rtl="0" algn="ctr">
+              <a:spcBef>
+                <a:spcPts val="0"/>
+              </a:spcBef>
+              <a:spcAft>
+                <a:spcPts val="0"/>
+              </a:spcAft>
+              <a:buNone/>
+            </a:pPr>
+            <a:r>
+              <a:rPr lang="en-CA" sz="1800">
+                <a:solidFill>
+                  <a:schemeClr val="lt1"/>
+                </a:solidFill>
+                <a:latin typeface="Arial"/>
+                <a:ea typeface="Arial"/>
+                <a:cs typeface="Arial"/>
+                <a:sym typeface="Arial"/>
+              </a:rPr>
+              <a:t>UniProt</a:t>
+            </a:r>
+            <a:endParaRPr sz="1800">
+              <a:solidFill>
+                <a:schemeClr val="lt1"/>
+              </a:solidFill>
+              <a:latin typeface="Arial"/>
+              <a:ea typeface="Arial"/>
+              <a:cs typeface="Arial"/>
+              <a:sym typeface="Arial"/>
+            </a:endParaRPr>
+          </a:p>
+        </p:txBody>
+      </p:sp>
+      <p:sp>
+        <p:nvSpPr>
+          <p:cNvPr id="141" name="Google Shape;141;p7"/>
+          <p:cNvSpPr/>
+          <p:nvPr/>
+        </p:nvSpPr>
+        <p:spPr>
+          <a:xfrm>
+            <a:off x="839787" y="3716837"/>
+            <a:ext cx="990000" cy="990000"/>
+          </a:xfrm>
+          <a:prstGeom prst="can">
+            <a:avLst>
+              <a:gd fmla="val 25000" name="adj"/>
+            </a:avLst>
+          </a:prstGeom>
+          <a:solidFill>
+            <a:schemeClr val="accent1"/>
+          </a:solidFill>
+          <a:ln cap="flat" cmpd="sng" w="12700">
+            <a:solidFill>
+              <a:srgbClr val="31538F"/>
+            </a:solidFill>
+            <a:prstDash val="solid"/>
+            <a:miter lim="800000"/>
+            <a:headEnd len="sm" w="sm" type="none"/>
+            <a:tailEnd len="sm" w="sm" type="none"/>
+          </a:ln>
+        </p:spPr>
+        <p:txBody>
+          <a:bodyPr anchorCtr="0" anchor="ctr" bIns="45700" lIns="91425" spcFirstLastPara="1" rIns="91425" wrap="square" tIns="45700">
+            <a:noAutofit/>
+          </a:bodyPr>
+          <a:lstStyle/>
+          <a:p>
+            <a:pPr indent="0" lvl="0" marL="0" rtl="0" algn="ctr">
+              <a:spcBef>
+                <a:spcPts val="0"/>
+              </a:spcBef>
+              <a:spcAft>
+                <a:spcPts val="0"/>
+              </a:spcAft>
+              <a:buClr>
+                <a:schemeClr val="dk1"/>
+              </a:buClr>
+              <a:buFont typeface="Arial"/>
+              <a:buNone/>
+            </a:pPr>
+            <a:r>
+              <a:rPr lang="en-CA" sz="1800">
+                <a:solidFill>
+                  <a:schemeClr val="lt1"/>
+                </a:solidFill>
+              </a:rPr>
+              <a:t>CIS-BP</a:t>
+            </a:r>
+            <a:endParaRPr>
+              <a:solidFill>
+                <a:schemeClr val="dk1"/>
+              </a:solidFill>
+            </a:endParaRPr>
+          </a:p>
+          <a:p>
+            <a:pPr indent="0" lvl="0" marL="0" rtl="0" algn="ctr">
+              <a:spcBef>
+                <a:spcPts val="0"/>
+              </a:spcBef>
+              <a:spcAft>
+                <a:spcPts val="0"/>
+              </a:spcAft>
+              <a:buClr>
+                <a:schemeClr val="dk1"/>
+              </a:buClr>
+              <a:buFont typeface="Arial"/>
+              <a:buNone/>
+            </a:pPr>
+            <a:r>
+              <a:rPr lang="en-CA" sz="1800">
+                <a:solidFill>
+                  <a:schemeClr val="lt1"/>
+                </a:solidFill>
+              </a:rPr>
+              <a:t>(2.0)</a:t>
+            </a:r>
+            <a:endParaRPr>
+              <a:solidFill>
+                <a:schemeClr val="lt1"/>
+              </a:solidFill>
+            </a:endParaRPr>
+          </a:p>
+        </p:txBody>
+      </p:sp>
+      <p:sp>
+        <p:nvSpPr>
+          <p:cNvPr id="142" name="Google Shape;142;p7"/>
+          <p:cNvSpPr txBox="1"/>
+          <p:nvPr/>
+        </p:nvSpPr>
+        <p:spPr>
+          <a:xfrm>
+            <a:off x="4509775" y="3891894"/>
+            <a:ext cx="1963800" cy="307800"/>
+          </a:xfrm>
+          <a:prstGeom prst="rect">
+            <a:avLst/>
+          </a:prstGeom>
+          <a:noFill/>
+          <a:ln>
+            <a:noFill/>
+          </a:ln>
+        </p:spPr>
+        <p:txBody>
+          <a:bodyPr anchorCtr="0" anchor="t" bIns="45700" lIns="91425" spcFirstLastPara="1" rIns="91425" wrap="square" tIns="45700">
+            <a:spAutoFit/>
+          </a:bodyPr>
+          <a:lstStyle/>
+          <a:p>
+            <a:pPr indent="0" lvl="0" marL="0" marR="0" rtl="0" algn="ctr">
+              <a:spcBef>
+                <a:spcPts val="0"/>
+              </a:spcBef>
+              <a:spcAft>
+                <a:spcPts val="0"/>
+              </a:spcAft>
+              <a:buNone/>
+            </a:pPr>
+            <a:r>
+              <a:rPr i="1" lang="en-CA">
+                <a:solidFill>
+                  <a:schemeClr val="dk1"/>
+                </a:solidFill>
+              </a:rPr>
+              <a:t>Gene + Species</a:t>
+            </a:r>
+            <a:endParaRPr i="1" sz="1400">
+              <a:solidFill>
+                <a:schemeClr val="dk1"/>
+              </a:solidFill>
+              <a:latin typeface="Arial"/>
+              <a:ea typeface="Arial"/>
+              <a:cs typeface="Arial"/>
+              <a:sym typeface="Arial"/>
+            </a:endParaRPr>
+          </a:p>
+        </p:txBody>
+      </p:sp>
+      <p:sp>
+        <p:nvSpPr>
+          <p:cNvPr id="143" name="Google Shape;143;p7"/>
+          <p:cNvSpPr txBox="1"/>
+          <p:nvPr/>
+        </p:nvSpPr>
+        <p:spPr>
+          <a:xfrm>
+            <a:off x="3763675" y="4193144"/>
+            <a:ext cx="3456000" cy="307800"/>
+          </a:xfrm>
+          <a:prstGeom prst="rect">
+            <a:avLst/>
+          </a:prstGeom>
+          <a:noFill/>
+          <a:ln>
+            <a:noFill/>
+          </a:ln>
+        </p:spPr>
+        <p:txBody>
+          <a:bodyPr anchorCtr="0" anchor="t" bIns="45700" lIns="91425" spcFirstLastPara="1" rIns="91425" wrap="square" tIns="45700">
+            <a:spAutoFit/>
+          </a:bodyPr>
+          <a:lstStyle/>
+          <a:p>
+            <a:pPr indent="0" lvl="0" marL="0" marR="0" rtl="0" algn="ctr">
+              <a:spcBef>
+                <a:spcPts val="0"/>
+              </a:spcBef>
+              <a:spcAft>
+                <a:spcPts val="0"/>
+              </a:spcAft>
+              <a:buNone/>
+            </a:pPr>
+            <a:r>
+              <a:rPr i="1" lang="en-CA">
+                <a:solidFill>
+                  <a:schemeClr val="dk1"/>
+                </a:solidFill>
+              </a:rPr>
+              <a:t>UniProt Accession/Entry</a:t>
+            </a:r>
+            <a:endParaRPr/>
+          </a:p>
+        </p:txBody>
+      </p:sp>
+      <p:cxnSp>
+        <p:nvCxnSpPr>
+          <p:cNvPr id="144" name="Google Shape;144;p7"/>
+          <p:cNvCxnSpPr>
+            <a:endCxn id="141" idx="4"/>
+          </p:cNvCxnSpPr>
+          <p:nvPr/>
+        </p:nvCxnSpPr>
+        <p:spPr>
+          <a:xfrm rot="10800000">
+            <a:off x="1829787" y="4211837"/>
+            <a:ext cx="1203600" cy="0"/>
+          </a:xfrm>
+          <a:prstGeom prst="straightConnector1">
+            <a:avLst/>
+          </a:prstGeom>
+          <a:noFill/>
+          <a:ln cap="flat" cmpd="sng" w="12700">
+            <a:solidFill>
+              <a:schemeClr val="dk1"/>
+            </a:solidFill>
+            <a:prstDash val="solid"/>
+            <a:miter lim="800000"/>
+            <a:headEnd len="med" w="med" type="stealth"/>
+            <a:tailEnd len="sm" w="sm" type="none"/>
+          </a:ln>
+        </p:spPr>
+      </p:cxnSp>
+      <p:sp>
+        <p:nvSpPr>
+          <p:cNvPr id="145" name="Google Shape;145;p7"/>
+          <p:cNvSpPr txBox="1"/>
+          <p:nvPr/>
+        </p:nvSpPr>
+        <p:spPr>
+          <a:xfrm>
+            <a:off x="1836675" y="4221419"/>
+            <a:ext cx="1203600" cy="1689000"/>
+          </a:xfrm>
+          <a:prstGeom prst="rect">
+            <a:avLst/>
+          </a:prstGeom>
+          <a:noFill/>
+          <a:ln>
+            <a:noFill/>
+          </a:ln>
+        </p:spPr>
+        <p:txBody>
+          <a:bodyPr anchorCtr="0" anchor="t" bIns="45700" lIns="91425" spcFirstLastPara="1" rIns="91425" wrap="square" tIns="45700">
+            <a:noAutofit/>
+          </a:bodyPr>
+          <a:lstStyle/>
+          <a:p>
+            <a:pPr indent="0" lvl="0" marL="0" marR="0" rtl="0" algn="ctr">
+              <a:spcBef>
+                <a:spcPts val="0"/>
+              </a:spcBef>
+              <a:spcAft>
+                <a:spcPts val="0"/>
+              </a:spcAft>
+              <a:buNone/>
+            </a:pPr>
+            <a:r>
+              <a:rPr i="1" lang="en-CA">
+                <a:solidFill>
+                  <a:schemeClr val="dk1"/>
+                </a:solidFill>
+              </a:rPr>
+              <a:t>Araport</a:t>
+            </a:r>
+            <a:endParaRPr i="1">
+              <a:solidFill>
+                <a:schemeClr val="dk1"/>
+              </a:solidFill>
+            </a:endParaRPr>
+          </a:p>
+          <a:p>
+            <a:pPr indent="0" lvl="0" marL="0" marR="0" rtl="0" algn="ctr">
+              <a:spcBef>
+                <a:spcPts val="0"/>
+              </a:spcBef>
+              <a:spcAft>
+                <a:spcPts val="0"/>
+              </a:spcAft>
+              <a:buNone/>
+            </a:pPr>
+            <a:r>
+              <a:rPr i="1" lang="en-CA" sz="1400">
+                <a:solidFill>
+                  <a:schemeClr val="dk1"/>
+                </a:solidFill>
+                <a:latin typeface="Arial"/>
+                <a:ea typeface="Arial"/>
+                <a:cs typeface="Arial"/>
+                <a:sym typeface="Arial"/>
+              </a:rPr>
+              <a:t>Ensembl</a:t>
+            </a:r>
+            <a:endParaRPr i="1" sz="1400">
+              <a:solidFill>
+                <a:schemeClr val="dk1"/>
+              </a:solidFill>
+              <a:latin typeface="Arial"/>
+              <a:ea typeface="Arial"/>
+              <a:cs typeface="Arial"/>
+              <a:sym typeface="Arial"/>
+            </a:endParaRPr>
+          </a:p>
+          <a:p>
+            <a:pPr indent="0" lvl="0" marL="0" marR="0" rtl="0" algn="ctr">
+              <a:spcBef>
+                <a:spcPts val="0"/>
+              </a:spcBef>
+              <a:spcAft>
+                <a:spcPts val="0"/>
+              </a:spcAft>
+              <a:buNone/>
+            </a:pPr>
+            <a:r>
+              <a:rPr i="1" lang="en-CA" sz="1400">
+                <a:solidFill>
+                  <a:schemeClr val="dk1"/>
+                </a:solidFill>
+                <a:latin typeface="Arial"/>
+                <a:ea typeface="Arial"/>
+                <a:cs typeface="Arial"/>
+                <a:sym typeface="Arial"/>
+              </a:rPr>
+              <a:t>FlyBase</a:t>
+            </a:r>
+            <a:endParaRPr i="1" sz="1400">
+              <a:solidFill>
+                <a:schemeClr val="dk1"/>
+              </a:solidFill>
+              <a:latin typeface="Arial"/>
+              <a:ea typeface="Arial"/>
+              <a:cs typeface="Arial"/>
+              <a:sym typeface="Arial"/>
+            </a:endParaRPr>
+          </a:p>
+          <a:p>
+            <a:pPr indent="0" lvl="0" marL="0" marR="0" rtl="0" algn="ctr">
+              <a:spcBef>
+                <a:spcPts val="0"/>
+              </a:spcBef>
+              <a:spcAft>
+                <a:spcPts val="0"/>
+              </a:spcAft>
+              <a:buNone/>
+            </a:pPr>
+            <a:r>
+              <a:rPr i="1" lang="en-CA" sz="1400">
+                <a:solidFill>
+                  <a:schemeClr val="dk1"/>
+                </a:solidFill>
+                <a:latin typeface="Arial"/>
+                <a:ea typeface="Arial"/>
+                <a:cs typeface="Arial"/>
+                <a:sym typeface="Arial"/>
+              </a:rPr>
+              <a:t>Gene Name</a:t>
+            </a:r>
+            <a:endParaRPr/>
+          </a:p>
+          <a:p>
+            <a:pPr indent="0" lvl="0" marL="0" marR="0" rtl="0" algn="ctr">
+              <a:spcBef>
+                <a:spcPts val="0"/>
+              </a:spcBef>
+              <a:spcAft>
+                <a:spcPts val="0"/>
+              </a:spcAft>
+              <a:buNone/>
+            </a:pPr>
+            <a:r>
+              <a:rPr i="1" lang="en-CA" sz="1400">
+                <a:solidFill>
+                  <a:schemeClr val="dk1"/>
+                </a:solidFill>
+                <a:latin typeface="Arial"/>
+                <a:ea typeface="Arial"/>
+                <a:cs typeface="Arial"/>
+                <a:sym typeface="Arial"/>
+              </a:rPr>
+              <a:t>WormBase</a:t>
+            </a:r>
+            <a:endParaRPr i="1">
+              <a:solidFill>
+                <a:schemeClr val="dk1"/>
+              </a:solidFill>
+            </a:endParaRPr>
+          </a:p>
+          <a:p>
+            <a:pPr indent="0" lvl="0" marL="0" marR="0" rtl="0" algn="ctr">
+              <a:spcBef>
+                <a:spcPts val="0"/>
+              </a:spcBef>
+              <a:spcAft>
+                <a:spcPts val="0"/>
+              </a:spcAft>
+              <a:buNone/>
+            </a:pPr>
+            <a:r>
+              <a:rPr i="1" lang="en-CA">
+                <a:solidFill>
+                  <a:schemeClr val="dk1"/>
+                </a:solidFill>
+              </a:rPr>
+              <a:t>OLN</a:t>
+            </a:r>
+            <a:endParaRPr i="1">
+              <a:solidFill>
+                <a:schemeClr val="dk1"/>
+              </a:solidFill>
+            </a:endParaRPr>
+          </a:p>
+        </p:txBody>
+      </p:sp>
+      <p:grpSp>
+        <p:nvGrpSpPr>
+          <p:cNvPr id="146" name="Google Shape;146;p7"/>
+          <p:cNvGrpSpPr/>
+          <p:nvPr/>
+        </p:nvGrpSpPr>
+        <p:grpSpPr>
+          <a:xfrm>
+            <a:off x="3763659" y="1400325"/>
+            <a:ext cx="3455939" cy="2041006"/>
+            <a:chOff x="4227744" y="920806"/>
+            <a:chExt cx="3455939" cy="2041006"/>
+          </a:xfrm>
+        </p:grpSpPr>
+        <p:sp>
+          <p:nvSpPr>
+            <p:cNvPr id="147" name="Google Shape;147;p7"/>
+            <p:cNvSpPr/>
+            <p:nvPr/>
+          </p:nvSpPr>
+          <p:spPr>
+            <a:xfrm>
+              <a:off x="6693683" y="920806"/>
               <a:ext cx="990000" cy="990000"/>
             </a:xfrm>
             <a:prstGeom prst="can">
@@ -17684,9 +18162,97 @@
                   <a:cs typeface="Arial"/>
                   <a:sym typeface="Arial"/>
                 </a:rPr>
-                <a:t>UniProt</a:t>
+                <a:t>ReMap</a:t>
               </a:r>
               <a:endParaRPr sz="1800">
+                <a:solidFill>
+                  <a:schemeClr val="lt1"/>
+                </a:solidFill>
+                <a:latin typeface="Arial"/>
+                <a:ea typeface="Arial"/>
+                <a:cs typeface="Arial"/>
+                <a:sym typeface="Arial"/>
+              </a:endParaRPr>
+            </a:p>
+            <a:p>
+              <a:pPr indent="0" lvl="0" marL="0" marR="0" rtl="0" algn="ctr">
+                <a:spcBef>
+                  <a:spcPts val="0"/>
+                </a:spcBef>
+                <a:spcAft>
+                  <a:spcPts val="0"/>
+                </a:spcAft>
+                <a:buNone/>
+              </a:pPr>
+              <a:r>
+                <a:rPr lang="en-CA" sz="1800">
+                  <a:solidFill>
+                    <a:schemeClr val="lt1"/>
+                  </a:solidFill>
+                  <a:latin typeface="Arial"/>
+                  <a:ea typeface="Arial"/>
+                  <a:cs typeface="Arial"/>
+                  <a:sym typeface="Arial"/>
+                </a:rPr>
+                <a:t>2020</a:t>
+              </a:r>
+              <a:endParaRPr sz="1800"/>
+            </a:p>
+          </p:txBody>
+        </p:sp>
+        <p:sp>
+          <p:nvSpPr>
+            <p:cNvPr id="148" name="Google Shape;148;p7"/>
+            <p:cNvSpPr/>
+            <p:nvPr/>
+          </p:nvSpPr>
+          <p:spPr>
+            <a:xfrm>
+              <a:off x="4844229" y="1971812"/>
+              <a:ext cx="990000" cy="990000"/>
+            </a:xfrm>
+            <a:prstGeom prst="can">
+              <a:avLst>
+                <a:gd fmla="val 25000" name="adj"/>
+              </a:avLst>
+            </a:prstGeom>
+            <a:solidFill>
+              <a:schemeClr val="accent1"/>
+            </a:solidFill>
+            <a:ln cap="flat" cmpd="sng" w="12700">
+              <a:solidFill>
+                <a:srgbClr val="31538F"/>
+              </a:solidFill>
+              <a:prstDash val="solid"/>
+              <a:miter lim="800000"/>
+              <a:headEnd len="sm" w="sm" type="none"/>
+              <a:tailEnd len="sm" w="sm" type="none"/>
+            </a:ln>
+          </p:spPr>
+          <p:txBody>
+            <a:bodyPr anchorCtr="0" anchor="ctr" bIns="45700" lIns="91425" spcFirstLastPara="1" rIns="91425" wrap="square" tIns="45700">
+              <a:noAutofit/>
+            </a:bodyPr>
+            <a:lstStyle/>
+            <a:p>
+              <a:pPr indent="0" lvl="0" marL="0" marR="0" rtl="0" algn="ctr">
+                <a:spcBef>
+                  <a:spcPts val="0"/>
+                </a:spcBef>
+                <a:spcAft>
+                  <a:spcPts val="0"/>
+                </a:spcAft>
+                <a:buNone/>
+              </a:pPr>
+              <a:r>
+                <a:rPr lang="en-CA" sz="1200">
+                  <a:solidFill>
+                    <a:schemeClr val="lt1"/>
+                  </a:solidFill>
+                </a:rPr>
+                <a:t>UniPROBE</a:t>
+              </a:r>
+              <a:endParaRPr sz="1200">
                 <a:solidFill>
                   <a:schemeClr val="lt1"/>
                 </a:solidFill>
@@ -17700,13 +18266,129 @@
         </p:sp>
         <p:sp>
           <p:nvSpPr>
-            <p:cNvPr id="142" name="Google Shape;142;p7"/>
+            <p:cNvPr id="149" name="Google Shape;149;p7"/>
             <p:cNvSpPr/>
             <p:nvPr/>
           </p:nvSpPr>
           <p:spPr>
             <a:xfrm>
-              <a:off x="839787" y="3465918"/>
+              <a:off x="6077198" y="1971812"/>
+              <a:ext cx="990000" cy="990000"/>
+            </a:xfrm>
+            <a:prstGeom prst="can">
+              <a:avLst>
+                <a:gd fmla="val 25000" name="adj"/>
+              </a:avLst>
+            </a:prstGeom>
+            <a:solidFill>
+              <a:schemeClr val="accent1"/>
+            </a:solidFill>
+            <a:ln cap="flat" cmpd="sng" w="12700">
+              <a:solidFill>
+                <a:srgbClr val="31538F"/>
+              </a:solidFill>
+              <a:prstDash val="solid"/>
+              <a:miter lim="800000"/>
+              <a:headEnd len="sm" w="sm" type="none"/>
+              <a:tailEnd len="sm" w="sm" type="none"/>
+            </a:ln>
+          </p:spPr>
+          <p:txBody>
+            <a:bodyPr anchorCtr="0" anchor="ctr" bIns="45700" lIns="91425" spcFirstLastPara="1" rIns="91425" wrap="square" tIns="45700">
+              <a:noAutofit/>
+            </a:bodyPr>
+            <a:lstStyle/>
+            <a:p>
+              <a:pPr indent="0" lvl="0" marL="0" marR="0" rtl="0" algn="ctr">
+                <a:spcBef>
+                  <a:spcPts val="0"/>
+                </a:spcBef>
+                <a:spcAft>
+                  <a:spcPts val="0"/>
+                </a:spcAft>
+                <a:buNone/>
+              </a:pPr>
+              <a:r>
+                <a:rPr lang="en-CA" sz="1800">
+                  <a:solidFill>
+                    <a:schemeClr val="lt1"/>
+                  </a:solidFill>
+                </a:rPr>
+                <a:t>SRA</a:t>
+              </a:r>
+              <a:endParaRPr/>
+            </a:p>
+          </p:txBody>
+        </p:sp>
+        <p:sp>
+          <p:nvSpPr>
+            <p:cNvPr id="150" name="Google Shape;150;p7"/>
+            <p:cNvSpPr/>
+            <p:nvPr/>
+          </p:nvSpPr>
+          <p:spPr>
+            <a:xfrm>
+              <a:off x="4227744" y="920806"/>
+              <a:ext cx="990000" cy="990000"/>
+            </a:xfrm>
+            <a:prstGeom prst="can">
+              <a:avLst>
+                <a:gd fmla="val 25000" name="adj"/>
+              </a:avLst>
+            </a:prstGeom>
+            <a:solidFill>
+              <a:schemeClr val="accent1"/>
+            </a:solidFill>
+            <a:ln cap="flat" cmpd="sng" w="12700">
+              <a:solidFill>
+                <a:srgbClr val="31538F"/>
+              </a:solidFill>
+              <a:prstDash val="solid"/>
+              <a:miter lim="800000"/>
+              <a:headEnd len="sm" w="sm" type="none"/>
+              <a:tailEnd len="sm" w="sm" type="none"/>
+            </a:ln>
+          </p:spPr>
+          <p:txBody>
+            <a:bodyPr anchorCtr="0" anchor="ctr" bIns="45700" lIns="91425" spcFirstLastPara="1" rIns="91425" wrap="square" tIns="45700">
+              <a:noAutofit/>
+            </a:bodyPr>
+            <a:lstStyle/>
+            <a:p>
+              <a:pPr indent="0" lvl="0" marL="0" marR="0" rtl="0" algn="ctr">
+                <a:spcBef>
+                  <a:spcPts val="0"/>
+                </a:spcBef>
+                <a:spcAft>
+                  <a:spcPts val="0"/>
+                </a:spcAft>
+                <a:buNone/>
+              </a:pPr>
+              <a:r>
+                <a:rPr lang="en-CA" sz="1200">
+                  <a:solidFill>
+                    <a:schemeClr val="lt1"/>
+                  </a:solidFill>
+                </a:rPr>
+                <a:t>ChIP-Atlas</a:t>
+              </a:r>
+              <a:endParaRPr sz="1200">
+                <a:solidFill>
+                  <a:schemeClr val="lt1"/>
+                </a:solidFill>
+              </a:endParaRPr>
+            </a:p>
+          </p:txBody>
+        </p:sp>
+        <p:sp>
+          <p:nvSpPr>
+            <p:cNvPr id="151" name="Google Shape;151;p7"/>
+            <p:cNvSpPr/>
+            <p:nvPr/>
+          </p:nvSpPr>
+          <p:spPr>
+            <a:xfrm>
+              <a:off x="5460713" y="920806"/>
               <a:ext cx="990000" cy="990000"/>
             </a:xfrm>
             <a:prstGeom prst="can">
@@ -17740,49 +18422,17 @@
                 <a:spcAft>
                   <a:spcPts val="0"/>
                 </a:spcAft>
-                <a:buClr>
-                  <a:schemeClr val="dk1"/>
-                </a:buClr>
-                <a:buFont typeface="Arial"/>
                 <a:buNone/>
               </a:pPr>
               <a:r>
-                <a:rPr lang="en-CA" sz="1800">
+                <a:rPr lang="en-CA" sz="1100">
                   <a:solidFill>
                     <a:schemeClr val="lt1"/>
                   </a:solidFill>
                 </a:rPr>
-                <a:t>CIS-BP</a:t>
+                <a:t>CistromeDB</a:t>
               </a:r>
-              <a:endParaRPr>
-                <a:solidFill>
-                  <a:schemeClr val="dk1"/>
-                </a:solidFill>
-              </a:endParaRPr>
-            </a:p>
-            <a:p>
-              <a:pPr indent="0" lvl="0" marL="0" rtl="0" algn="ctr">
-                <a:spcBef>
-                  <a:spcPts val="0"/>
-                </a:spcBef>
-                <a:spcAft>
-                  <a:spcPts val="0"/>
-                </a:spcAft>
-                <a:buClr>
-                  <a:schemeClr val="dk1"/>
-                </a:buClr>
-                <a:buFont typeface="Arial"/>
-                <a:buNone/>
-              </a:pPr>
-              <a:r>
-                <a:rPr lang="en-CA" sz="1800">
-                  <a:solidFill>
-                    <a:schemeClr val="lt1"/>
-                  </a:solidFill>
-                </a:rPr>
-                <a:t>(2.0)</a:t>
-              </a:r>
-              <a:endParaRPr>
+              <a:endParaRPr sz="1000">
                 <a:solidFill>
                   <a:schemeClr val="lt1"/>
                 </a:solidFill>
@@ -17790,811 +18440,10 @@
             </a:p>
           </p:txBody>
         </p:sp>
-        <p:sp>
-          <p:nvSpPr>
-            <p:cNvPr id="143" name="Google Shape;143;p7"/>
-            <p:cNvSpPr txBox="1"/>
-            <p:nvPr/>
-          </p:nvSpPr>
-          <p:spPr>
-            <a:xfrm>
-              <a:off x="4509775" y="3640975"/>
-              <a:ext cx="1963800" cy="307800"/>
-            </a:xfrm>
-            <a:prstGeom prst="rect">
-              <a:avLst/>
-            </a:prstGeom>
-            <a:noFill/>
-            <a:ln>
-              <a:noFill/>
-            </a:ln>
-          </p:spPr>
-          <p:txBody>
-            <a:bodyPr anchorCtr="0" anchor="t" bIns="45700" lIns="91425" spcFirstLastPara="1" rIns="91425" wrap="square" tIns="45700">
-              <a:spAutoFit/>
-            </a:bodyPr>
-            <a:lstStyle/>
-            <a:p>
-              <a:pPr indent="0" lvl="0" marL="0" marR="0" rtl="0" algn="ctr">
-                <a:spcBef>
-                  <a:spcPts val="0"/>
-                </a:spcBef>
-                <a:spcAft>
-                  <a:spcPts val="0"/>
-                </a:spcAft>
-                <a:buNone/>
-              </a:pPr>
-              <a:r>
-                <a:rPr i="1" lang="en-CA">
-                  <a:solidFill>
-                    <a:schemeClr val="dk1"/>
-                  </a:solidFill>
-                </a:rPr>
-                <a:t>Gene + Species</a:t>
-              </a:r>
-              <a:endParaRPr i="1" sz="1400">
-                <a:solidFill>
-                  <a:schemeClr val="dk1"/>
-                </a:solidFill>
-                <a:latin typeface="Arial"/>
-                <a:ea typeface="Arial"/>
-                <a:cs typeface="Arial"/>
-                <a:sym typeface="Arial"/>
-              </a:endParaRPr>
-            </a:p>
-          </p:txBody>
-        </p:sp>
-        <p:sp>
-          <p:nvSpPr>
-            <p:cNvPr id="144" name="Google Shape;144;p7"/>
-            <p:cNvSpPr txBox="1"/>
-            <p:nvPr/>
-          </p:nvSpPr>
-          <p:spPr>
-            <a:xfrm>
-              <a:off x="3763675" y="3942225"/>
-              <a:ext cx="3456000" cy="307800"/>
-            </a:xfrm>
-            <a:prstGeom prst="rect">
-              <a:avLst/>
-            </a:prstGeom>
-            <a:noFill/>
-            <a:ln>
-              <a:noFill/>
-            </a:ln>
-          </p:spPr>
-          <p:txBody>
-            <a:bodyPr anchorCtr="0" anchor="t" bIns="45700" lIns="91425" spcFirstLastPara="1" rIns="91425" wrap="square" tIns="45700">
-              <a:spAutoFit/>
-            </a:bodyPr>
-            <a:lstStyle/>
-            <a:p>
-              <a:pPr indent="0" lvl="0" marL="0" marR="0" rtl="0" algn="ctr">
-                <a:spcBef>
-                  <a:spcPts val="0"/>
-                </a:spcBef>
-                <a:spcAft>
-                  <a:spcPts val="0"/>
-                </a:spcAft>
-                <a:buNone/>
-              </a:pPr>
-              <a:r>
-                <a:rPr i="1" lang="en-CA">
-                  <a:solidFill>
-                    <a:schemeClr val="dk1"/>
-                  </a:solidFill>
-                </a:rPr>
-                <a:t>UniProt Accession/Entry</a:t>
-              </a:r>
-              <a:endParaRPr/>
-            </a:p>
-          </p:txBody>
-        </p:sp>
-        <p:cxnSp>
-          <p:nvCxnSpPr>
-            <p:cNvPr id="145" name="Google Shape;145;p7"/>
-            <p:cNvCxnSpPr>
-              <a:endCxn id="142" idx="4"/>
-            </p:cNvCxnSpPr>
-            <p:nvPr/>
-          </p:nvCxnSpPr>
-          <p:spPr>
-            <a:xfrm rot="10800000">
-              <a:off x="1829787" y="3960918"/>
-              <a:ext cx="1203600" cy="0"/>
-            </a:xfrm>
-            <a:prstGeom prst="straightConnector1">
-              <a:avLst/>
-            </a:prstGeom>
-            <a:noFill/>
-            <a:ln cap="flat" cmpd="sng" w="12700">
-              <a:solidFill>
-                <a:schemeClr val="dk1"/>
-              </a:solidFill>
-              <a:prstDash val="solid"/>
-              <a:miter lim="800000"/>
-              <a:headEnd len="med" w="med" type="stealth"/>
-              <a:tailEnd len="sm" w="sm" type="none"/>
-            </a:ln>
-          </p:spPr>
-        </p:cxnSp>
-        <p:sp>
-          <p:nvSpPr>
-            <p:cNvPr id="146" name="Google Shape;146;p7"/>
-            <p:cNvSpPr txBox="1"/>
-            <p:nvPr/>
-          </p:nvSpPr>
-          <p:spPr>
-            <a:xfrm>
-              <a:off x="1836675" y="3970500"/>
-              <a:ext cx="1203600" cy="1689000"/>
-            </a:xfrm>
-            <a:prstGeom prst="rect">
-              <a:avLst/>
-            </a:prstGeom>
-            <a:noFill/>
-            <a:ln>
-              <a:noFill/>
-            </a:ln>
-          </p:spPr>
-          <p:txBody>
-            <a:bodyPr anchorCtr="0" anchor="t" bIns="45700" lIns="91425" spcFirstLastPara="1" rIns="91425" wrap="square" tIns="45700">
-              <a:noAutofit/>
-            </a:bodyPr>
-            <a:lstStyle/>
-            <a:p>
-              <a:pPr indent="0" lvl="0" marL="0" marR="0" rtl="0" algn="ctr">
-                <a:spcBef>
-                  <a:spcPts val="0"/>
-                </a:spcBef>
-                <a:spcAft>
-                  <a:spcPts val="0"/>
-                </a:spcAft>
-                <a:buNone/>
-              </a:pPr>
-              <a:r>
-                <a:rPr i="1" lang="en-CA">
-                  <a:solidFill>
-                    <a:schemeClr val="dk1"/>
-                  </a:solidFill>
-                </a:rPr>
-                <a:t>Araport</a:t>
-              </a:r>
-              <a:endParaRPr i="1">
-                <a:solidFill>
-                  <a:schemeClr val="dk1"/>
-                </a:solidFill>
-              </a:endParaRPr>
-            </a:p>
-            <a:p>
-              <a:pPr indent="0" lvl="0" marL="0" marR="0" rtl="0" algn="ctr">
-                <a:spcBef>
-                  <a:spcPts val="0"/>
-                </a:spcBef>
-                <a:spcAft>
-                  <a:spcPts val="0"/>
-                </a:spcAft>
-                <a:buNone/>
-              </a:pPr>
-              <a:r>
-                <a:rPr i="1" lang="en-CA" sz="1400">
-                  <a:solidFill>
-                    <a:schemeClr val="dk1"/>
-                  </a:solidFill>
-                  <a:latin typeface="Arial"/>
-                  <a:ea typeface="Arial"/>
-                  <a:cs typeface="Arial"/>
-                  <a:sym typeface="Arial"/>
-                </a:rPr>
-                <a:t>Ensembl</a:t>
-              </a:r>
-              <a:endParaRPr i="1" sz="1400">
-                <a:solidFill>
-                  <a:schemeClr val="dk1"/>
-                </a:solidFill>
-                <a:latin typeface="Arial"/>
-                <a:ea typeface="Arial"/>
-                <a:cs typeface="Arial"/>
-                <a:sym typeface="Arial"/>
-              </a:endParaRPr>
-            </a:p>
-            <a:p>
-              <a:pPr indent="0" lvl="0" marL="0" marR="0" rtl="0" algn="ctr">
-                <a:spcBef>
-                  <a:spcPts val="0"/>
-                </a:spcBef>
-                <a:spcAft>
-                  <a:spcPts val="0"/>
-                </a:spcAft>
-                <a:buNone/>
-              </a:pPr>
-              <a:r>
-                <a:rPr i="1" lang="en-CA" sz="1400">
-                  <a:solidFill>
-                    <a:schemeClr val="dk1"/>
-                  </a:solidFill>
-                  <a:latin typeface="Arial"/>
-                  <a:ea typeface="Arial"/>
-                  <a:cs typeface="Arial"/>
-                  <a:sym typeface="Arial"/>
-                </a:rPr>
-                <a:t>FlyBase</a:t>
-              </a:r>
-              <a:endParaRPr i="1" sz="1400">
-                <a:solidFill>
-                  <a:schemeClr val="dk1"/>
-                </a:solidFill>
-                <a:latin typeface="Arial"/>
-                <a:ea typeface="Arial"/>
-                <a:cs typeface="Arial"/>
-                <a:sym typeface="Arial"/>
-              </a:endParaRPr>
-            </a:p>
-            <a:p>
-              <a:pPr indent="0" lvl="0" marL="0" marR="0" rtl="0" algn="ctr">
-                <a:spcBef>
-                  <a:spcPts val="0"/>
-                </a:spcBef>
-                <a:spcAft>
-                  <a:spcPts val="0"/>
-                </a:spcAft>
-                <a:buNone/>
-              </a:pPr>
-              <a:r>
-                <a:rPr i="1" lang="en-CA" sz="1400">
-                  <a:solidFill>
-                    <a:schemeClr val="dk1"/>
-                  </a:solidFill>
-                  <a:latin typeface="Arial"/>
-                  <a:ea typeface="Arial"/>
-                  <a:cs typeface="Arial"/>
-                  <a:sym typeface="Arial"/>
-                </a:rPr>
-                <a:t>Gene Name</a:t>
-              </a:r>
-              <a:endParaRPr/>
-            </a:p>
-            <a:p>
-              <a:pPr indent="0" lvl="0" marL="0" marR="0" rtl="0" algn="ctr">
-                <a:spcBef>
-                  <a:spcPts val="0"/>
-                </a:spcBef>
-                <a:spcAft>
-                  <a:spcPts val="0"/>
-                </a:spcAft>
-                <a:buNone/>
-              </a:pPr>
-              <a:r>
-                <a:rPr i="1" lang="en-CA" sz="1400">
-                  <a:solidFill>
-                    <a:schemeClr val="dk1"/>
-                  </a:solidFill>
-                  <a:latin typeface="Arial"/>
-                  <a:ea typeface="Arial"/>
-                  <a:cs typeface="Arial"/>
-                  <a:sym typeface="Arial"/>
-                </a:rPr>
-                <a:t>WormBase</a:t>
-              </a:r>
-              <a:endParaRPr i="1">
-                <a:solidFill>
-                  <a:schemeClr val="dk1"/>
-                </a:solidFill>
-              </a:endParaRPr>
-            </a:p>
-            <a:p>
-              <a:pPr indent="0" lvl="0" marL="0" marR="0" rtl="0" algn="ctr">
-                <a:spcBef>
-                  <a:spcPts val="0"/>
-                </a:spcBef>
-                <a:spcAft>
-                  <a:spcPts val="0"/>
-                </a:spcAft>
-                <a:buNone/>
-              </a:pPr>
-              <a:r>
-                <a:rPr i="1" lang="en-CA">
-                  <a:solidFill>
-                    <a:schemeClr val="dk1"/>
-                  </a:solidFill>
-                </a:rPr>
-                <a:t>OLN</a:t>
-              </a:r>
-              <a:endParaRPr i="1">
-                <a:solidFill>
-                  <a:schemeClr val="dk1"/>
-                </a:solidFill>
-              </a:endParaRPr>
-            </a:p>
-          </p:txBody>
-        </p:sp>
-        <p:grpSp>
-          <p:nvGrpSpPr>
-            <p:cNvPr id="147" name="Google Shape;147;p7"/>
-            <p:cNvGrpSpPr/>
-            <p:nvPr/>
-          </p:nvGrpSpPr>
-          <p:grpSpPr>
-            <a:xfrm>
-              <a:off x="3763659" y="1149406"/>
-              <a:ext cx="4072423" cy="2041006"/>
-              <a:chOff x="3611259" y="920806"/>
-              <a:chExt cx="4072423" cy="2041006"/>
-            </a:xfrm>
-          </p:grpSpPr>
-          <p:sp>
-            <p:nvSpPr>
-              <p:cNvPr id="148" name="Google Shape;148;p7"/>
-              <p:cNvSpPr/>
-              <p:nvPr/>
-            </p:nvSpPr>
-            <p:spPr>
-              <a:xfrm>
-                <a:off x="6693683" y="920806"/>
-                <a:ext cx="990000" cy="990000"/>
-              </a:xfrm>
-              <a:prstGeom prst="can">
-                <a:avLst>
-                  <a:gd fmla="val 25000" name="adj"/>
-                </a:avLst>
-              </a:prstGeom>
-              <a:solidFill>
-                <a:schemeClr val="accent1"/>
-              </a:solidFill>
-              <a:ln cap="flat" cmpd="sng" w="12700">
-                <a:solidFill>
-                  <a:srgbClr val="31538F"/>
-                </a:solidFill>
-                <a:prstDash val="solid"/>
-                <a:miter lim="800000"/>
-                <a:headEnd len="sm" w="sm" type="none"/>
-                <a:tailEnd len="sm" w="sm" type="none"/>
-              </a:ln>
-            </p:spPr>
-            <p:txBody>
-              <a:bodyPr anchorCtr="0" anchor="ctr" bIns="45700" lIns="91425" spcFirstLastPara="1" rIns="91425" wrap="square" tIns="45700">
-                <a:noAutofit/>
-              </a:bodyPr>
-              <a:lstStyle/>
-              <a:p>
-                <a:pPr indent="0" lvl="0" marL="0" marR="0" rtl="0" algn="ctr">
-                  <a:spcBef>
-                    <a:spcPts val="0"/>
-                  </a:spcBef>
-                  <a:spcAft>
-                    <a:spcPts val="0"/>
-                  </a:spcAft>
-                  <a:buNone/>
-                </a:pPr>
-                <a:r>
-                  <a:rPr lang="en-CA" sz="1800">
-                    <a:solidFill>
-                      <a:schemeClr val="lt1"/>
-                    </a:solidFill>
-                    <a:latin typeface="Arial"/>
-                    <a:ea typeface="Arial"/>
-                    <a:cs typeface="Arial"/>
-                    <a:sym typeface="Arial"/>
-                  </a:rPr>
-                  <a:t>ReMap</a:t>
-                </a:r>
-                <a:endParaRPr sz="1800">
-                  <a:solidFill>
-                    <a:schemeClr val="lt1"/>
-                  </a:solidFill>
-                  <a:latin typeface="Arial"/>
-                  <a:ea typeface="Arial"/>
-                  <a:cs typeface="Arial"/>
-                  <a:sym typeface="Arial"/>
-                </a:endParaRPr>
-              </a:p>
-              <a:p>
-                <a:pPr indent="0" lvl="0" marL="0" marR="0" rtl="0" algn="ctr">
-                  <a:spcBef>
-                    <a:spcPts val="0"/>
-                  </a:spcBef>
-                  <a:spcAft>
-                    <a:spcPts val="0"/>
-                  </a:spcAft>
-                  <a:buNone/>
-                </a:pPr>
-                <a:r>
-                  <a:rPr lang="en-CA" sz="1800">
-                    <a:solidFill>
-                      <a:schemeClr val="lt1"/>
-                    </a:solidFill>
-                    <a:latin typeface="Arial"/>
-                    <a:ea typeface="Arial"/>
-                    <a:cs typeface="Arial"/>
-                    <a:sym typeface="Arial"/>
-                  </a:rPr>
-                  <a:t>2020</a:t>
-                </a:r>
-                <a:endParaRPr sz="1800"/>
-              </a:p>
-            </p:txBody>
-          </p:sp>
-          <p:sp>
-            <p:nvSpPr>
-              <p:cNvPr id="149" name="Google Shape;149;p7"/>
-              <p:cNvSpPr/>
-              <p:nvPr/>
-            </p:nvSpPr>
-            <p:spPr>
-              <a:xfrm>
-                <a:off x="4844229" y="1971812"/>
-                <a:ext cx="990000" cy="990000"/>
-              </a:xfrm>
-              <a:prstGeom prst="can">
-                <a:avLst>
-                  <a:gd fmla="val 25000" name="adj"/>
-                </a:avLst>
-              </a:prstGeom>
-              <a:solidFill>
-                <a:schemeClr val="accent1"/>
-              </a:solidFill>
-              <a:ln cap="flat" cmpd="sng" w="12700">
-                <a:solidFill>
-                  <a:srgbClr val="31538F"/>
-                </a:solidFill>
-                <a:prstDash val="solid"/>
-                <a:miter lim="800000"/>
-                <a:headEnd len="sm" w="sm" type="none"/>
-                <a:tailEnd len="sm" w="sm" type="none"/>
-              </a:ln>
-            </p:spPr>
-            <p:txBody>
-              <a:bodyPr anchorCtr="0" anchor="ctr" bIns="45700" lIns="91425" spcFirstLastPara="1" rIns="91425" wrap="square" tIns="45700">
-                <a:noAutofit/>
-              </a:bodyPr>
-              <a:lstStyle/>
-              <a:p>
-                <a:pPr indent="0" lvl="0" marL="0" marR="0" rtl="0" algn="ctr">
-                  <a:spcBef>
-                    <a:spcPts val="0"/>
-                  </a:spcBef>
-                  <a:spcAft>
-                    <a:spcPts val="0"/>
-                  </a:spcAft>
-                  <a:buNone/>
-                </a:pPr>
-                <a:r>
-                  <a:rPr lang="en-CA" sz="1200">
-                    <a:solidFill>
-                      <a:schemeClr val="lt1"/>
-                    </a:solidFill>
-                  </a:rPr>
-                  <a:t>UniPROBE</a:t>
-                </a:r>
-                <a:endParaRPr sz="1200">
-                  <a:solidFill>
-                    <a:schemeClr val="lt1"/>
-                  </a:solidFill>
-                  <a:latin typeface="Arial"/>
-                  <a:ea typeface="Arial"/>
-                  <a:cs typeface="Arial"/>
-                  <a:sym typeface="Arial"/>
-                </a:endParaRPr>
-              </a:p>
-            </p:txBody>
-          </p:sp>
-          <p:sp>
-            <p:nvSpPr>
-              <p:cNvPr id="150" name="Google Shape;150;p7"/>
-              <p:cNvSpPr/>
-              <p:nvPr/>
-            </p:nvSpPr>
-            <p:spPr>
-              <a:xfrm>
-                <a:off x="3611259" y="1971812"/>
-                <a:ext cx="990000" cy="990000"/>
-              </a:xfrm>
-              <a:prstGeom prst="can">
-                <a:avLst>
-                  <a:gd fmla="val 25000" name="adj"/>
-                </a:avLst>
-              </a:prstGeom>
-              <a:solidFill>
-                <a:schemeClr val="accent1"/>
-              </a:solidFill>
-              <a:ln cap="flat" cmpd="sng" w="12700">
-                <a:solidFill>
-                  <a:srgbClr val="31538F"/>
-                </a:solidFill>
-                <a:prstDash val="solid"/>
-                <a:miter lim="800000"/>
-                <a:headEnd len="sm" w="sm" type="none"/>
-                <a:tailEnd len="sm" w="sm" type="none"/>
-              </a:ln>
-            </p:spPr>
-            <p:txBody>
-              <a:bodyPr anchorCtr="0" anchor="ctr" bIns="45700" lIns="91425" spcFirstLastPara="1" rIns="91425" wrap="square" tIns="45700">
-                <a:noAutofit/>
-              </a:bodyPr>
-              <a:lstStyle/>
-              <a:p>
-                <a:pPr indent="0" lvl="0" marL="0" marR="0" rtl="0" algn="ctr">
-                  <a:spcBef>
-                    <a:spcPts val="0"/>
-                  </a:spcBef>
-                  <a:spcAft>
-                    <a:spcPts val="0"/>
-                  </a:spcAft>
-                  <a:buNone/>
-                </a:pPr>
-                <a:r>
-                  <a:rPr lang="en-CA" sz="1800">
-                    <a:solidFill>
-                      <a:schemeClr val="lt1"/>
-                    </a:solidFill>
-                  </a:rPr>
-                  <a:t>CIS-BP</a:t>
-                </a:r>
-                <a:endParaRPr sz="1800">
-                  <a:solidFill>
-                    <a:schemeClr val="lt1"/>
-                  </a:solidFill>
-                </a:endParaRPr>
-              </a:p>
-              <a:p>
-                <a:pPr indent="0" lvl="0" marL="0" marR="0" rtl="0" algn="ctr">
-                  <a:spcBef>
-                    <a:spcPts val="0"/>
-                  </a:spcBef>
-                  <a:spcAft>
-                    <a:spcPts val="0"/>
-                  </a:spcAft>
-                  <a:buNone/>
-                </a:pPr>
-                <a:r>
-                  <a:rPr lang="en-CA" sz="1800">
-                    <a:solidFill>
-                      <a:schemeClr val="lt1"/>
-                    </a:solidFill>
-                  </a:rPr>
-                  <a:t>(2.0)</a:t>
-                </a:r>
-                <a:endParaRPr sz="1800">
-                  <a:solidFill>
-                    <a:schemeClr val="lt1"/>
-                  </a:solidFill>
-                </a:endParaRPr>
-              </a:p>
-            </p:txBody>
-          </p:sp>
-          <p:sp>
-            <p:nvSpPr>
-              <p:cNvPr id="151" name="Google Shape;151;p7"/>
-              <p:cNvSpPr/>
-              <p:nvPr/>
-            </p:nvSpPr>
-            <p:spPr>
-              <a:xfrm>
-                <a:off x="6077198" y="1971812"/>
-                <a:ext cx="990000" cy="990000"/>
-              </a:xfrm>
-              <a:prstGeom prst="can">
-                <a:avLst>
-                  <a:gd fmla="val 25000" name="adj"/>
-                </a:avLst>
-              </a:prstGeom>
-              <a:solidFill>
-                <a:schemeClr val="accent1"/>
-              </a:solidFill>
-              <a:ln cap="flat" cmpd="sng" w="12700">
-                <a:solidFill>
-                  <a:srgbClr val="31538F"/>
-                </a:solidFill>
-                <a:prstDash val="solid"/>
-                <a:miter lim="800000"/>
-                <a:headEnd len="sm" w="sm" type="none"/>
-                <a:tailEnd len="sm" w="sm" type="none"/>
-              </a:ln>
-            </p:spPr>
-            <p:txBody>
-              <a:bodyPr anchorCtr="0" anchor="ctr" bIns="45700" lIns="91425" spcFirstLastPara="1" rIns="91425" wrap="square" tIns="45700">
-                <a:noAutofit/>
-              </a:bodyPr>
-              <a:lstStyle/>
-              <a:p>
-                <a:pPr indent="0" lvl="0" marL="0" marR="0" rtl="0" algn="ctr">
-                  <a:spcBef>
-                    <a:spcPts val="0"/>
-                  </a:spcBef>
-                  <a:spcAft>
-                    <a:spcPts val="0"/>
-                  </a:spcAft>
-                  <a:buNone/>
-                </a:pPr>
-                <a:r>
-                  <a:rPr lang="en-CA" sz="1800">
-                    <a:solidFill>
-                      <a:schemeClr val="lt1"/>
-                    </a:solidFill>
-                  </a:rPr>
-                  <a:t>SRA</a:t>
-                </a:r>
-                <a:endParaRPr/>
-              </a:p>
-            </p:txBody>
-          </p:sp>
-          <p:sp>
-            <p:nvSpPr>
-              <p:cNvPr id="152" name="Google Shape;152;p7"/>
-              <p:cNvSpPr/>
-              <p:nvPr/>
-            </p:nvSpPr>
-            <p:spPr>
-              <a:xfrm>
-                <a:off x="4227744" y="920806"/>
-                <a:ext cx="990000" cy="990000"/>
-              </a:xfrm>
-              <a:prstGeom prst="can">
-                <a:avLst>
-                  <a:gd fmla="val 25000" name="adj"/>
-                </a:avLst>
-              </a:prstGeom>
-              <a:solidFill>
-                <a:schemeClr val="accent1"/>
-              </a:solidFill>
-              <a:ln cap="flat" cmpd="sng" w="12700">
-                <a:solidFill>
-                  <a:srgbClr val="31538F"/>
-                </a:solidFill>
-                <a:prstDash val="solid"/>
-                <a:miter lim="800000"/>
-                <a:headEnd len="sm" w="sm" type="none"/>
-                <a:tailEnd len="sm" w="sm" type="none"/>
-              </a:ln>
-            </p:spPr>
-            <p:txBody>
-              <a:bodyPr anchorCtr="0" anchor="ctr" bIns="45700" lIns="91425" spcFirstLastPara="1" rIns="91425" wrap="square" tIns="45700">
-                <a:noAutofit/>
-              </a:bodyPr>
-              <a:lstStyle/>
-              <a:p>
-                <a:pPr indent="0" lvl="0" marL="0" marR="0" rtl="0" algn="ctr">
-                  <a:spcBef>
-                    <a:spcPts val="0"/>
-                  </a:spcBef>
-                  <a:spcAft>
-                    <a:spcPts val="0"/>
-                  </a:spcAft>
-                  <a:buNone/>
-                </a:pPr>
-                <a:r>
-                  <a:rPr lang="en-CA" sz="1200">
-                    <a:solidFill>
-                      <a:schemeClr val="lt1"/>
-                    </a:solidFill>
-                  </a:rPr>
-                  <a:t>ChIP-Atlas</a:t>
-                </a:r>
-                <a:endParaRPr sz="1200">
-                  <a:solidFill>
-                    <a:schemeClr val="lt1"/>
-                  </a:solidFill>
-                </a:endParaRPr>
-              </a:p>
-            </p:txBody>
-          </p:sp>
-          <p:sp>
-            <p:nvSpPr>
-              <p:cNvPr id="153" name="Google Shape;153;p7"/>
-              <p:cNvSpPr/>
-              <p:nvPr/>
-            </p:nvSpPr>
-            <p:spPr>
-              <a:xfrm>
-                <a:off x="5460713" y="920806"/>
-                <a:ext cx="990000" cy="990000"/>
-              </a:xfrm>
-              <a:prstGeom prst="can">
-                <a:avLst>
-                  <a:gd fmla="val 25000" name="adj"/>
-                </a:avLst>
-              </a:prstGeom>
-              <a:solidFill>
-                <a:schemeClr val="accent1"/>
-              </a:solidFill>
-              <a:ln cap="flat" cmpd="sng" w="12700">
-                <a:solidFill>
-                  <a:srgbClr val="31538F"/>
-                </a:solidFill>
-                <a:prstDash val="solid"/>
-                <a:miter lim="800000"/>
-                <a:headEnd len="sm" w="sm" type="none"/>
-                <a:tailEnd len="sm" w="sm" type="none"/>
-              </a:ln>
-            </p:spPr>
-            <p:txBody>
-              <a:bodyPr anchorCtr="0" anchor="ctr" bIns="45700" lIns="91425" spcFirstLastPara="1" rIns="91425" wrap="square" tIns="45700">
-                <a:noAutofit/>
-              </a:bodyPr>
-              <a:lstStyle/>
-              <a:p>
-                <a:pPr indent="0" lvl="0" marL="0" rtl="0" algn="ctr">
-                  <a:spcBef>
-                    <a:spcPts val="0"/>
-                  </a:spcBef>
-                  <a:spcAft>
-                    <a:spcPts val="0"/>
-                  </a:spcAft>
-                  <a:buNone/>
-                </a:pPr>
-                <a:r>
-                  <a:rPr lang="en-CA" sz="1100">
-                    <a:solidFill>
-                      <a:schemeClr val="lt1"/>
-                    </a:solidFill>
-                  </a:rPr>
-                  <a:t>CistromeDB</a:t>
-                </a:r>
-                <a:endParaRPr sz="1000">
-                  <a:solidFill>
-                    <a:schemeClr val="lt1"/>
-                  </a:solidFill>
-                </a:endParaRPr>
-              </a:p>
-            </p:txBody>
-          </p:sp>
-        </p:grpSp>
-        <p:cxnSp>
-          <p:nvCxnSpPr>
-            <p:cNvPr id="154" name="Google Shape;154;p7"/>
-            <p:cNvCxnSpPr/>
-            <p:nvPr/>
-          </p:nvCxnSpPr>
-          <p:spPr>
-            <a:xfrm>
-              <a:off x="5491208" y="4250024"/>
-              <a:ext cx="300" cy="585000"/>
-            </a:xfrm>
-            <a:prstGeom prst="straightConnector1">
-              <a:avLst/>
-            </a:prstGeom>
-            <a:noFill/>
-            <a:ln cap="flat" cmpd="sng" w="12700">
-              <a:solidFill>
-                <a:schemeClr val="dk1"/>
-              </a:solidFill>
-              <a:prstDash val="solid"/>
-              <a:miter lim="800000"/>
-              <a:headEnd len="med" w="med" type="stealth"/>
-              <a:tailEnd len="sm" w="sm" type="none"/>
-            </a:ln>
-          </p:spPr>
-        </p:cxnSp>
-        <p:cxnSp>
-          <p:nvCxnSpPr>
-            <p:cNvPr id="155" name="Google Shape;155;p7"/>
-            <p:cNvCxnSpPr/>
-            <p:nvPr/>
-          </p:nvCxnSpPr>
-          <p:spPr>
-            <a:xfrm flipH="1" rot="10800000">
-              <a:off x="5491206" y="3190383"/>
-              <a:ext cx="300" cy="450600"/>
-            </a:xfrm>
-            <a:prstGeom prst="straightConnector1">
-              <a:avLst/>
-            </a:prstGeom>
-            <a:noFill/>
-            <a:ln cap="flat" cmpd="sng" w="12700">
-              <a:solidFill>
-                <a:schemeClr val="dk1"/>
-              </a:solidFill>
-              <a:prstDash val="solid"/>
-              <a:miter lim="800000"/>
-              <a:headEnd len="med" w="med" type="stealth"/>
-              <a:tailEnd len="sm" w="sm" type="none"/>
-            </a:ln>
-          </p:spPr>
-        </p:cxnSp>
       </p:grpSp>
       <p:sp>
         <p:nvSpPr>
-          <p:cNvPr id="156" name="Google Shape;156;p7"/>
+          <p:cNvPr id="152" name="Google Shape;152;p7"/>
           <p:cNvSpPr txBox="1"/>
           <p:nvPr/>
         </p:nvSpPr>
@@ -18835,6 +18684,58 @@
           </a:p>
         </p:txBody>
       </p:sp>
+      <p:cxnSp>
+        <p:nvCxnSpPr>
+          <p:cNvPr id="153" name="Google Shape;153;p7"/>
+          <p:cNvCxnSpPr/>
+          <p:nvPr/>
+        </p:nvCxnSpPr>
+        <p:spPr>
+          <a:xfrm flipH="1" rot="10800000">
+            <a:off x="5491206" y="3441302"/>
+            <a:ext cx="300" cy="450600"/>
+          </a:xfrm>
+          <a:prstGeom prst="straightConnector1">
+            <a:avLst/>
+          </a:prstGeom>
+          <a:noFill/>
+          <a:ln cap="flat" cmpd="sng" w="12700">
+            <a:solidFill>
+              <a:schemeClr val="dk1"/>
+            </a:solidFill>
+            <a:prstDash val="solid"/>
+            <a:miter lim="800000"/>
+            <a:headEnd len="med" w="med" type="stealth"/>
+            <a:tailEnd len="sm" w="sm" type="none"/>
+          </a:ln>
+        </p:spPr>
+      </p:cxnSp>
+      <p:cxnSp>
+        <p:nvCxnSpPr>
+          <p:cNvPr id="154" name="Google Shape;154;p7"/>
+          <p:cNvCxnSpPr/>
+          <p:nvPr/>
+        </p:nvCxnSpPr>
+        <p:spPr>
+          <a:xfrm>
+            <a:off x="5491206" y="4508102"/>
+            <a:ext cx="300" cy="450600"/>
+          </a:xfrm>
+          <a:prstGeom prst="straightConnector1">
+            <a:avLst/>
+          </a:prstGeom>
+          <a:noFill/>
+          <a:ln cap="flat" cmpd="sng" w="12700">
+            <a:solidFill>
+              <a:schemeClr val="dk1"/>
+            </a:solidFill>
+            <a:prstDash val="solid"/>
+            <a:miter lim="800000"/>
+            <a:headEnd len="med" w="med" type="stealth"/>
+            <a:tailEnd len="sm" w="sm" type="none"/>
+          </a:ln>
+        </p:spPr>
+      </p:cxnSp>
     </p:spTree>
   </p:cSld>
   <p:clrMapOvr>
@@ -18848,7 +18749,7 @@
   <p:cSld>
     <p:spTree>
       <p:nvGrpSpPr>
-        <p:cNvPr id="161" name="Shape 161"/>
+        <p:cNvPr id="159" name="Shape 159"/>
         <p:cNvGrpSpPr/>
         <p:nvPr/>
       </p:nvGrpSpPr>
@@ -18862,7 +18763,7 @@
       </p:grpSpPr>
       <p:cxnSp>
         <p:nvCxnSpPr>
-          <p:cNvPr id="162" name="Google Shape;162;g7e530ecb0e_4_17"/>
+          <p:cNvPr id="160" name="Google Shape;160;g7e530ecb0e_4_17"/>
           <p:cNvCxnSpPr/>
           <p:nvPr/>
         </p:nvCxnSpPr>
@@ -18888,7 +18789,7 @@
       </p:cxnSp>
       <p:sp>
         <p:nvSpPr>
-          <p:cNvPr id="163" name="Google Shape;163;g7e530ecb0e_4_17"/>
+          <p:cNvPr id="161" name="Google Shape;161;g7e530ecb0e_4_17"/>
           <p:cNvSpPr txBox="1"/>
           <p:nvPr/>
         </p:nvSpPr>
@@ -18934,7 +18835,7 @@
       </p:sp>
       <p:sp>
         <p:nvSpPr>
-          <p:cNvPr id="164" name="Google Shape;164;g7e530ecb0e_4_17"/>
+          <p:cNvPr id="162" name="Google Shape;162;g7e530ecb0e_4_17"/>
           <p:cNvSpPr txBox="1"/>
           <p:nvPr>
             <p:ph idx="12" type="sldNum"/>
@@ -18978,7 +18879,7 @@
       </p:sp>
       <p:sp>
         <p:nvSpPr>
-          <p:cNvPr id="165" name="Google Shape;165;g7e530ecb0e_4_17"/>
+          <p:cNvPr id="163" name="Google Shape;163;g7e530ecb0e_4_17"/>
           <p:cNvSpPr txBox="1"/>
           <p:nvPr/>
         </p:nvSpPr>
@@ -19051,7 +18952,7 @@
   <p:cSld>
     <p:spTree>
       <p:nvGrpSpPr>
-        <p:cNvPr id="170" name="Shape 170"/>
+        <p:cNvPr id="168" name="Shape 168"/>
         <p:cNvGrpSpPr/>
         <p:nvPr/>
       </p:nvGrpSpPr>
@@ -19065,7 +18966,7 @@
       </p:grpSpPr>
       <p:cxnSp>
         <p:nvCxnSpPr>
-          <p:cNvPr id="171" name="Google Shape;171;p9"/>
+          <p:cNvPr id="169" name="Google Shape;169;p9"/>
           <p:cNvCxnSpPr/>
           <p:nvPr/>
         </p:nvCxnSpPr>
@@ -19091,7 +18992,7 @@
       </p:cxnSp>
       <p:sp>
         <p:nvSpPr>
-          <p:cNvPr id="172" name="Google Shape;172;p9"/>
+          <p:cNvPr id="170" name="Google Shape;170;p9"/>
           <p:cNvSpPr txBox="1"/>
           <p:nvPr/>
         </p:nvSpPr>
@@ -19141,7 +19042,7 @@
       </p:sp>
       <p:sp>
         <p:nvSpPr>
-          <p:cNvPr id="173" name="Google Shape;173;p9"/>
+          <p:cNvPr id="171" name="Google Shape;171;p9"/>
           <p:cNvSpPr txBox="1"/>
           <p:nvPr>
             <p:ph idx="12" type="sldNum"/>
@@ -19185,7 +19086,7 @@
       </p:sp>
       <p:sp>
         <p:nvSpPr>
-          <p:cNvPr id="174" name="Google Shape;174;p9"/>
+          <p:cNvPr id="172" name="Google Shape;172;p9"/>
           <p:cNvSpPr txBox="1"/>
           <p:nvPr/>
         </p:nvSpPr>
@@ -19701,7 +19602,7 @@
   <p:cSld>
     <p:spTree>
       <p:nvGrpSpPr>
-        <p:cNvPr id="179" name="Shape 179"/>
+        <p:cNvPr id="177" name="Shape 177"/>
         <p:cNvGrpSpPr/>
         <p:nvPr/>
       </p:nvGrpSpPr>
@@ -19715,7 +19616,7 @@
       </p:grpSpPr>
       <p:cxnSp>
         <p:nvCxnSpPr>
-          <p:cNvPr id="180" name="Google Shape;180;g7e530ecb0e_2_5"/>
+          <p:cNvPr id="178" name="Google Shape;178;g7e530ecb0e_2_5"/>
           <p:cNvCxnSpPr/>
           <p:nvPr/>
         </p:nvCxnSpPr>
@@ -19741,7 +19642,7 @@
       </p:cxnSp>
       <p:sp>
         <p:nvSpPr>
-          <p:cNvPr id="181" name="Google Shape;181;g7e530ecb0e_2_5"/>
+          <p:cNvPr id="179" name="Google Shape;179;g7e530ecb0e_2_5"/>
           <p:cNvSpPr txBox="1"/>
           <p:nvPr/>
         </p:nvSpPr>
@@ -19787,7 +19688,7 @@
       </p:sp>
       <p:sp>
         <p:nvSpPr>
-          <p:cNvPr id="182" name="Google Shape;182;g7e530ecb0e_2_5"/>
+          <p:cNvPr id="180" name="Google Shape;180;g7e530ecb0e_2_5"/>
           <p:cNvSpPr txBox="1"/>
           <p:nvPr>
             <p:ph idx="12" type="sldNum"/>
@@ -19831,7 +19732,7 @@
       </p:sp>
       <p:sp>
         <p:nvSpPr>
-          <p:cNvPr id="183" name="Google Shape;183;g7e530ecb0e_2_5"/>
+          <p:cNvPr id="181" name="Google Shape;181;g7e530ecb0e_2_5"/>
           <p:cNvSpPr txBox="1"/>
           <p:nvPr/>
         </p:nvSpPr>
@@ -19919,7 +19820,7 @@
   <p:cSld>
     <p:spTree>
       <p:nvGrpSpPr>
-        <p:cNvPr id="188" name="Shape 188"/>
+        <p:cNvPr id="186" name="Shape 186"/>
         <p:cNvGrpSpPr/>
         <p:nvPr/>
       </p:nvGrpSpPr>
@@ -19933,7 +19834,7 @@
       </p:grpSpPr>
       <p:cxnSp>
         <p:nvCxnSpPr>
-          <p:cNvPr id="189" name="Google Shape;189;g7e530ecb0e_2_69"/>
+          <p:cNvPr id="187" name="Google Shape;187;g7e530ecb0e_2_69"/>
           <p:cNvCxnSpPr/>
           <p:nvPr/>
         </p:nvCxnSpPr>
@@ -19959,7 +19860,7 @@
       </p:cxnSp>
       <p:sp>
         <p:nvSpPr>
-          <p:cNvPr id="190" name="Google Shape;190;g7e530ecb0e_2_69"/>
+          <p:cNvPr id="188" name="Google Shape;188;g7e530ecb0e_2_69"/>
           <p:cNvSpPr txBox="1"/>
           <p:nvPr/>
         </p:nvSpPr>
@@ -20005,7 +19906,7 @@
       </p:sp>
       <p:sp>
         <p:nvSpPr>
-          <p:cNvPr id="191" name="Google Shape;191;g7e530ecb0e_2_69"/>
+          <p:cNvPr id="189" name="Google Shape;189;g7e530ecb0e_2_69"/>
           <p:cNvSpPr txBox="1"/>
           <p:nvPr>
             <p:ph idx="12" type="sldNum"/>
@@ -20049,7 +19950,7 @@
       </p:sp>
       <p:sp>
         <p:nvSpPr>
-          <p:cNvPr id="192" name="Google Shape;192;g7e530ecb0e_2_69"/>
+          <p:cNvPr id="190" name="Google Shape;190;g7e530ecb0e_2_69"/>
           <p:cNvSpPr txBox="1"/>
           <p:nvPr/>
         </p:nvSpPr>
@@ -21087,7 +20988,7 @@
 <file path=ppt/theme/theme1.xml><?xml version="1.0" encoding="utf-8"?>
 <a:theme xmlns:a="http://schemas.openxmlformats.org/drawingml/2006/main" xmlns:r="http://schemas.openxmlformats.org/officeDocument/2006/relationships" name="Office Theme">
   <a:themeElements>
-    <a:clrScheme name="Office">
+    <a:clrScheme name="Office Theme">
       <a:dk1>
         <a:srgbClr val="000000"/>
       </a:dk1>
@@ -21366,7 +21267,7 @@
 <file path=ppt/theme/theme2.xml><?xml version="1.0" encoding="utf-8"?>
 <a:theme xmlns:a="http://schemas.openxmlformats.org/drawingml/2006/main" xmlns:r="http://schemas.openxmlformats.org/officeDocument/2006/relationships" name="Office Theme">
   <a:themeElements>
-    <a:clrScheme name="Office Theme">
+    <a:clrScheme name="Office">
       <a:dk1>
         <a:srgbClr val="000000"/>
       </a:dk1>

</xml_diff>